<commit_message>
Updates to deck & readme
</commit_message>
<xml_diff>
--- a/recording-architectural-decisions-ignite.pptx
+++ b/recording-architectural-decisions-ignite.pptx
@@ -5,7 +5,7 @@
     <p:sldMasterId id="2147483648" r:id="rId1"/>
   </p:sldMasterIdLst>
   <p:notesMasterIdLst>
-    <p:notesMasterId r:id="rId23"/>
+    <p:notesMasterId r:id="rId22"/>
   </p:notesMasterIdLst>
   <p:sldIdLst>
     <p:sldId id="256" r:id="rId2"/>
@@ -13,22 +13,21 @@
     <p:sldId id="263" r:id="rId4"/>
     <p:sldId id="291" r:id="rId5"/>
     <p:sldId id="265" r:id="rId6"/>
-    <p:sldId id="273" r:id="rId7"/>
-    <p:sldId id="299" r:id="rId8"/>
-    <p:sldId id="302" r:id="rId9"/>
-    <p:sldId id="303" r:id="rId10"/>
-    <p:sldId id="304" r:id="rId11"/>
-    <p:sldId id="305" r:id="rId12"/>
-    <p:sldId id="306" r:id="rId13"/>
-    <p:sldId id="307" r:id="rId14"/>
-    <p:sldId id="268" r:id="rId15"/>
-    <p:sldId id="311" r:id="rId16"/>
-    <p:sldId id="301" r:id="rId17"/>
-    <p:sldId id="270" r:id="rId18"/>
-    <p:sldId id="266" r:id="rId19"/>
-    <p:sldId id="312" r:id="rId20"/>
-    <p:sldId id="308" r:id="rId21"/>
-    <p:sldId id="257" r:id="rId22"/>
+    <p:sldId id="299" r:id="rId7"/>
+    <p:sldId id="302" r:id="rId8"/>
+    <p:sldId id="303" r:id="rId9"/>
+    <p:sldId id="304" r:id="rId10"/>
+    <p:sldId id="305" r:id="rId11"/>
+    <p:sldId id="306" r:id="rId12"/>
+    <p:sldId id="307" r:id="rId13"/>
+    <p:sldId id="268" r:id="rId14"/>
+    <p:sldId id="311" r:id="rId15"/>
+    <p:sldId id="301" r:id="rId16"/>
+    <p:sldId id="270" r:id="rId17"/>
+    <p:sldId id="266" r:id="rId18"/>
+    <p:sldId id="312" r:id="rId19"/>
+    <p:sldId id="308" r:id="rId20"/>
+    <p:sldId id="257" r:id="rId21"/>
   </p:sldIdLst>
   <p:sldSz cx="12192000" cy="6858000"/>
   <p:notesSz cx="6858000" cy="9144000"/>
@@ -530,51 +529,25 @@
           <a:p>
             <a:r>
               <a:rPr lang="en-US" dirty="0"/>
-              <a:t>As technologists, we make important architectural decisions every day</a:t>
-            </a:r>
+              <a:t>Hi! I’m David Ayers, Principal Architect with Credera, a full service technology and management consulting firm.</a:t>
+            </a:r>
+          </a:p>
+          <a:p>
+            <a:endParaRPr lang="en-US" dirty="0"/>
           </a:p>
           <a:p>
             <a:r>
               <a:rPr lang="en-US" dirty="0"/>
-              <a:t>These decisions can range from far reaching (Angular vs. React) to mundane (Infinite scroll vs. pagination for search results)</a:t>
-            </a:r>
+              <a:t>I’m here to talk about a problem that we all have. </a:t>
+            </a:r>
+          </a:p>
+          <a:p>
+            <a:endParaRPr lang="en-US" dirty="0"/>
           </a:p>
           <a:p>
             <a:r>
               <a:rPr lang="en-US" dirty="0"/>
-              <a:t>These decisions can be made by one person, or made by the team</a:t>
-            </a:r>
-          </a:p>
-          <a:p>
-            <a:r>
-              <a:rPr lang="en-US" dirty="0"/>
-              <a:t>Most of us do a great job and carefully thinking through these decisions:</a:t>
-            </a:r>
-          </a:p>
-          <a:p>
-            <a:r>
-              <a:rPr lang="en-US" dirty="0"/>
-              <a:t>Taking into account all of the pros and cons of the many different options</a:t>
-            </a:r>
-          </a:p>
-          <a:p>
-            <a:r>
-              <a:rPr lang="en-US" dirty="0"/>
-              <a:t>Discussing these options with the team</a:t>
-            </a:r>
-          </a:p>
-          <a:p>
-            <a:r>
-              <a:rPr lang="en-US" dirty="0"/>
-              <a:t>Perhaps doing a spike or a "</a:t>
-            </a:r>
-            <a:r>
-              <a:rPr lang="en-US" dirty="0" err="1"/>
-              <a:t>pepsi</a:t>
-            </a:r>
-            <a:r>
-              <a:rPr lang="en-US" dirty="0"/>
-              <a:t> challenge" to determine a "best fit" for a particular decision</a:t>
+              <a:t>We made decisions every day, some big, some small, that effect to overall architecture of whatever we’re working on. </a:t>
             </a:r>
           </a:p>
         </p:txBody>
@@ -596,7 +569,7 @@
           <a:p>
             <a:fld id="{E42DF656-43DD-C647-8193-729F56EE6E13}" type="slidenum">
               <a:rPr lang="en-US" smtClean="0"/>
-              <a:t>2</a:t>
+              <a:t>1</a:t>
             </a:fld>
             <a:endParaRPr lang="en-US"/>
           </a:p>
@@ -605,7 +578,7 @@
     </p:spTree>
     <p:extLst>
       <p:ext uri="{BB962C8B-B14F-4D97-AF65-F5344CB8AC3E}">
-        <p14:creationId xmlns:p14="http://schemas.microsoft.com/office/powerpoint/2010/main" val="2566387134"/>
+        <p14:creationId xmlns:p14="http://schemas.microsoft.com/office/powerpoint/2010/main" val="151811750"/>
       </p:ext>
     </p:extLst>
   </p:cSld>
@@ -700,7 +673,7 @@
           <a:p>
             <a:fld id="{096F4AFB-61BD-1340-90B6-0FECED04B0A2}" type="slidenum">
               <a:rPr lang="en-US" smtClean="0"/>
-              <a:t>11</a:t>
+              <a:t>10</a:t>
             </a:fld>
             <a:endParaRPr lang="en-US"/>
           </a:p>
@@ -804,7 +777,7 @@
           <a:p>
             <a:fld id="{096F4AFB-61BD-1340-90B6-0FECED04B0A2}" type="slidenum">
               <a:rPr lang="en-US" smtClean="0"/>
-              <a:t>12</a:t>
+              <a:t>11</a:t>
             </a:fld>
             <a:endParaRPr lang="en-US"/>
           </a:p>
@@ -908,7 +881,7 @@
           <a:p>
             <a:fld id="{096F4AFB-61BD-1340-90B6-0FECED04B0A2}" type="slidenum">
               <a:rPr lang="en-US" smtClean="0"/>
-              <a:t>13</a:t>
+              <a:t>12</a:t>
             </a:fld>
             <a:endParaRPr lang="en-US"/>
           </a:p>
@@ -1009,7 +982,7 @@
           <a:p>
             <a:fld id="{E42DF656-43DD-C647-8193-729F56EE6E13}" type="slidenum">
               <a:rPr lang="en-US" smtClean="0"/>
-              <a:t>14</a:t>
+              <a:t>13</a:t>
             </a:fld>
             <a:endParaRPr lang="en-US"/>
           </a:p>
@@ -1117,7 +1090,7 @@
           <a:p>
             <a:fld id="{E42DF656-43DD-C647-8193-729F56EE6E13}" type="slidenum">
               <a:rPr lang="en-US" smtClean="0"/>
-              <a:t>15</a:t>
+              <a:t>14</a:t>
             </a:fld>
             <a:endParaRPr lang="en-US"/>
           </a:p>
@@ -1445,7 +1418,7 @@
           <a:p>
             <a:fld id="{096F4AFB-61BD-1340-90B6-0FECED04B0A2}" type="slidenum">
               <a:rPr lang="en-US" smtClean="0"/>
-              <a:t>16</a:t>
+              <a:t>15</a:t>
             </a:fld>
             <a:endParaRPr lang="en-US"/>
           </a:p>
@@ -1550,7 +1523,7 @@
           <a:p>
             <a:fld id="{E42DF656-43DD-C647-8193-729F56EE6E13}" type="slidenum">
               <a:rPr lang="en-US" smtClean="0"/>
-              <a:t>17</a:t>
+              <a:t>16</a:t>
             </a:fld>
             <a:endParaRPr lang="en-US"/>
           </a:p>
@@ -1718,7 +1691,7 @@
           <a:p>
             <a:fld id="{E42DF656-43DD-C647-8193-729F56EE6E13}" type="slidenum">
               <a:rPr lang="en-US" smtClean="0"/>
-              <a:t>18</a:t>
+              <a:t>17</a:t>
             </a:fld>
             <a:endParaRPr lang="en-US"/>
           </a:p>
@@ -1860,7 +1833,7 @@
           <a:p>
             <a:fld id="{E42DF656-43DD-C647-8193-729F56EE6E13}" type="slidenum">
               <a:rPr lang="en-US" smtClean="0"/>
-              <a:t>19</a:t>
+              <a:t>18</a:t>
             </a:fld>
             <a:endParaRPr lang="en-US"/>
           </a:p>
@@ -2018,7 +1991,7 @@
           <a:p>
             <a:fld id="{096F4AFB-61BD-1340-90B6-0FECED04B0A2}" type="slidenum">
               <a:rPr lang="en-US" smtClean="0"/>
-              <a:t>20</a:t>
+              <a:t>19</a:t>
             </a:fld>
             <a:endParaRPr lang="en-US"/>
           </a:p>
@@ -2083,7 +2056,7 @@
           <a:p>
             <a:r>
               <a:rPr lang="en-US" dirty="0"/>
-              <a:t>And then we go about implementing it</a:t>
+              <a:t>These decisions can range from far reaching (Angular vs. React) to mundane (Infinite scroll vs. pagination for search results)</a:t>
             </a:r>
           </a:p>
           <a:p>
@@ -2092,54 +2065,43 @@
           <a:p>
             <a:r>
               <a:rPr lang="en-US" dirty="0"/>
-              <a:t>Maybe we update a user story with some of the information that led to the decision (usually not though)</a:t>
-            </a:r>
-          </a:p>
-          <a:p>
-            <a:pPr marL="0" marR="0" lvl="0" indent="0" algn="l" defTabSz="914400" rtl="0" eaLnBrk="1" fontAlgn="auto" latinLnBrk="0" hangingPunct="1">
-              <a:lnSpc>
-                <a:spcPct val="100000"/>
-              </a:lnSpc>
-              <a:spcBef>
-                <a:spcPts val="0"/>
-              </a:spcBef>
-              <a:spcAft>
-                <a:spcPts val="0"/>
-              </a:spcAft>
-              <a:buClrTx/>
-              <a:buSzTx/>
-              <a:buFontTx/>
-              <a:buNone/>
-              <a:tabLst/>
-              <a:defRPr/>
-            </a:pPr>
+              <a:t>These decisions can be made by one person, or made by the team</a:t>
+            </a:r>
+          </a:p>
+          <a:p>
             <a:endParaRPr lang="en-US" dirty="0"/>
           </a:p>
           <a:p>
-            <a:pPr marL="0" marR="0" lvl="0" indent="0" algn="l" defTabSz="914400" rtl="0" eaLnBrk="1" fontAlgn="auto" latinLnBrk="0" hangingPunct="1">
-              <a:lnSpc>
-                <a:spcPct val="100000"/>
-              </a:lnSpc>
-              <a:spcBef>
-                <a:spcPts val="0"/>
-              </a:spcBef>
-              <a:spcAft>
-                <a:spcPts val="0"/>
-              </a:spcAft>
-              <a:buClrTx/>
-              <a:buSzTx/>
-              <a:buFontTx/>
-              <a:buNone/>
-              <a:tabLst/>
-              <a:defRPr/>
-            </a:pPr>
             <a:r>
               <a:rPr lang="en-US" dirty="0"/>
-              <a:t>And all of that context is lost</a:t>
-            </a:r>
-          </a:p>
-          <a:p>
-            <a:endParaRPr lang="en-US" dirty="0"/>
+              <a:t>Most of us do a great job and carefully thinking through these decisions:</a:t>
+            </a:r>
+          </a:p>
+          <a:p>
+            <a:r>
+              <a:rPr lang="en-US" dirty="0"/>
+              <a:t>	Taking into account all of the pros and cons of the many different options</a:t>
+            </a:r>
+          </a:p>
+          <a:p>
+            <a:r>
+              <a:rPr lang="en-US" dirty="0"/>
+              <a:t>	Discussing these options with the team</a:t>
+            </a:r>
+          </a:p>
+          <a:p>
+            <a:r>
+              <a:rPr lang="en-US" dirty="0"/>
+              <a:t>	Perhaps doing a spike or a "</a:t>
+            </a:r>
+            <a:r>
+              <a:rPr lang="en-US" dirty="0" err="1"/>
+              <a:t>pepsi</a:t>
+            </a:r>
+            <a:r>
+              <a:rPr lang="en-US" dirty="0"/>
+              <a:t> challenge" to determine a "best fit" for a particular decision</a:t>
+            </a:r>
           </a:p>
         </p:txBody>
       </p:sp>
@@ -2160,7 +2122,7 @@
           <a:p>
             <a:fld id="{E42DF656-43DD-C647-8193-729F56EE6E13}" type="slidenum">
               <a:rPr lang="en-US" smtClean="0"/>
-              <a:t>3</a:t>
+              <a:t>2</a:t>
             </a:fld>
             <a:endParaRPr lang="en-US"/>
           </a:p>
@@ -2169,7 +2131,103 @@
     </p:spTree>
     <p:extLst>
       <p:ext uri="{BB962C8B-B14F-4D97-AF65-F5344CB8AC3E}">
-        <p14:creationId xmlns:p14="http://schemas.microsoft.com/office/powerpoint/2010/main" val="2367754036"/>
+        <p14:creationId xmlns:p14="http://schemas.microsoft.com/office/powerpoint/2010/main" val="2566387134"/>
+      </p:ext>
+    </p:extLst>
+  </p:cSld>
+  <p:clrMapOvr>
+    <a:masterClrMapping/>
+  </p:clrMapOvr>
+</p:notes>
+</file>
+
+<file path=ppt/notesSlides/notesSlide20.xml><?xml version="1.0" encoding="utf-8"?>
+<p:notes xmlns:a="http://schemas.openxmlformats.org/drawingml/2006/main" xmlns:r="http://schemas.openxmlformats.org/officeDocument/2006/relationships" xmlns:p="http://schemas.openxmlformats.org/presentationml/2006/main">
+  <p:cSld>
+    <p:spTree>
+      <p:nvGrpSpPr>
+        <p:cNvPr id="1" name=""/>
+        <p:cNvGrpSpPr/>
+        <p:nvPr/>
+      </p:nvGrpSpPr>
+      <p:grpSpPr>
+        <a:xfrm>
+          <a:off x="0" y="0"/>
+          <a:ext cx="0" cy="0"/>
+          <a:chOff x="0" y="0"/>
+          <a:chExt cx="0" cy="0"/>
+        </a:xfrm>
+      </p:grpSpPr>
+      <p:sp>
+        <p:nvSpPr>
+          <p:cNvPr id="2" name="Slide Image Placeholder 1"/>
+          <p:cNvSpPr>
+            <a:spLocks noGrp="1" noRot="1" noChangeAspect="1"/>
+          </p:cNvSpPr>
+          <p:nvPr>
+            <p:ph type="sldImg"/>
+          </p:nvPr>
+        </p:nvSpPr>
+        <p:spPr/>
+      </p:sp>
+      <p:sp>
+        <p:nvSpPr>
+          <p:cNvPr id="3" name="Notes Placeholder 2"/>
+          <p:cNvSpPr>
+            <a:spLocks noGrp="1"/>
+          </p:cNvSpPr>
+          <p:nvPr>
+            <p:ph type="body" idx="1"/>
+          </p:nvPr>
+        </p:nvSpPr>
+        <p:spPr/>
+        <p:txBody>
+          <a:bodyPr/>
+          <a:lstStyle/>
+          <a:p>
+            <a:r>
+              <a:rPr lang="en-US" dirty="0"/>
+              <a:t>In the repo listed on this slide, you’ll find links to more information about ADRs and some tools that people have written to help create ADRs.</a:t>
+            </a:r>
+          </a:p>
+          <a:p>
+            <a:endParaRPr lang="en-US" dirty="0"/>
+          </a:p>
+          <a:p>
+            <a:r>
+              <a:rPr lang="en-US" dirty="0"/>
+              <a:t>Thanks everyone for your time, have a great rest of the conference!</a:t>
+            </a:r>
+          </a:p>
+        </p:txBody>
+      </p:sp>
+      <p:sp>
+        <p:nvSpPr>
+          <p:cNvPr id="4" name="Slide Number Placeholder 3"/>
+          <p:cNvSpPr>
+            <a:spLocks noGrp="1"/>
+          </p:cNvSpPr>
+          <p:nvPr>
+            <p:ph type="sldNum" sz="quarter" idx="5"/>
+          </p:nvPr>
+        </p:nvSpPr>
+        <p:spPr/>
+        <p:txBody>
+          <a:bodyPr/>
+          <a:lstStyle/>
+          <a:p>
+            <a:fld id="{E42DF656-43DD-C647-8193-729F56EE6E13}" type="slidenum">
+              <a:rPr lang="en-US" smtClean="0"/>
+              <a:t>20</a:t>
+            </a:fld>
+            <a:endParaRPr lang="en-US"/>
+          </a:p>
+        </p:txBody>
+      </p:sp>
+    </p:spTree>
+    <p:extLst>
+      <p:ext uri="{BB962C8B-B14F-4D97-AF65-F5344CB8AC3E}">
+        <p14:creationId xmlns:p14="http://schemas.microsoft.com/office/powerpoint/2010/main" val="3737030522"/>
       </p:ext>
     </p:extLst>
   </p:cSld>
@@ -2206,6 +2264,166 @@
             <p:ph type="sldImg"/>
           </p:nvPr>
         </p:nvSpPr>
+        <p:spPr/>
+      </p:sp>
+      <p:sp>
+        <p:nvSpPr>
+          <p:cNvPr id="3" name="Notes Placeholder 2"/>
+          <p:cNvSpPr>
+            <a:spLocks noGrp="1"/>
+          </p:cNvSpPr>
+          <p:nvPr>
+            <p:ph type="body" idx="1"/>
+          </p:nvPr>
+        </p:nvSpPr>
+        <p:spPr/>
+        <p:txBody>
+          <a:bodyPr/>
+          <a:lstStyle/>
+          <a:p>
+            <a:r>
+              <a:rPr lang="en-US" dirty="0"/>
+              <a:t>And then we go about implementing it</a:t>
+            </a:r>
+          </a:p>
+          <a:p>
+            <a:endParaRPr lang="en-US" dirty="0"/>
+          </a:p>
+          <a:p>
+            <a:r>
+              <a:rPr lang="en-US" dirty="0"/>
+              <a:t>Maybe we update a user story with some of the information that led to the decision.</a:t>
+            </a:r>
+          </a:p>
+          <a:p>
+            <a:endParaRPr lang="en-US" dirty="0"/>
+          </a:p>
+          <a:p>
+            <a:r>
+              <a:rPr lang="en-US" dirty="0"/>
+              <a:t>Maybe we put some information on a wiki page.</a:t>
+            </a:r>
+          </a:p>
+          <a:p>
+            <a:endParaRPr lang="en-US" dirty="0"/>
+          </a:p>
+          <a:p>
+            <a:r>
+              <a:rPr lang="en-US" dirty="0"/>
+              <a:t>Usually though, none of these things are done.</a:t>
+            </a:r>
+          </a:p>
+          <a:p>
+            <a:pPr marL="0" marR="0" lvl="0" indent="0" algn="l" defTabSz="914400" rtl="0" eaLnBrk="1" fontAlgn="auto" latinLnBrk="0" hangingPunct="1">
+              <a:lnSpc>
+                <a:spcPct val="100000"/>
+              </a:lnSpc>
+              <a:spcBef>
+                <a:spcPts val="0"/>
+              </a:spcBef>
+              <a:spcAft>
+                <a:spcPts val="0"/>
+              </a:spcAft>
+              <a:buClrTx/>
+              <a:buSzTx/>
+              <a:buFontTx/>
+              <a:buNone/>
+              <a:tabLst/>
+              <a:defRPr/>
+            </a:pPr>
+            <a:endParaRPr lang="en-US" dirty="0"/>
+          </a:p>
+          <a:p>
+            <a:pPr marL="0" marR="0" lvl="0" indent="0" algn="l" defTabSz="914400" rtl="0" eaLnBrk="1" fontAlgn="auto" latinLnBrk="0" hangingPunct="1">
+              <a:lnSpc>
+                <a:spcPct val="100000"/>
+              </a:lnSpc>
+              <a:spcBef>
+                <a:spcPts val="0"/>
+              </a:spcBef>
+              <a:spcAft>
+                <a:spcPts val="0"/>
+              </a:spcAft>
+              <a:buClrTx/>
+              <a:buSzTx/>
+              <a:buFontTx/>
+              <a:buNone/>
+              <a:tabLst/>
+              <a:defRPr/>
+            </a:pPr>
+            <a:r>
+              <a:rPr lang="en-US" dirty="0"/>
+              <a:t>And all of that context is lost</a:t>
+            </a:r>
+          </a:p>
+          <a:p>
+            <a:endParaRPr lang="en-US" dirty="0"/>
+          </a:p>
+        </p:txBody>
+      </p:sp>
+      <p:sp>
+        <p:nvSpPr>
+          <p:cNvPr id="4" name="Slide Number Placeholder 3"/>
+          <p:cNvSpPr>
+            <a:spLocks noGrp="1"/>
+          </p:cNvSpPr>
+          <p:nvPr>
+            <p:ph type="sldNum" sz="quarter" idx="5"/>
+          </p:nvPr>
+        </p:nvSpPr>
+        <p:spPr/>
+        <p:txBody>
+          <a:bodyPr/>
+          <a:lstStyle/>
+          <a:p>
+            <a:fld id="{E42DF656-43DD-C647-8193-729F56EE6E13}" type="slidenum">
+              <a:rPr lang="en-US" smtClean="0"/>
+              <a:t>3</a:t>
+            </a:fld>
+            <a:endParaRPr lang="en-US"/>
+          </a:p>
+        </p:txBody>
+      </p:sp>
+    </p:spTree>
+    <p:extLst>
+      <p:ext uri="{BB962C8B-B14F-4D97-AF65-F5344CB8AC3E}">
+        <p14:creationId xmlns:p14="http://schemas.microsoft.com/office/powerpoint/2010/main" val="2367754036"/>
+      </p:ext>
+    </p:extLst>
+  </p:cSld>
+  <p:clrMapOvr>
+    <a:masterClrMapping/>
+  </p:clrMapOvr>
+</p:notes>
+</file>
+
+<file path=ppt/notesSlides/notesSlide4.xml><?xml version="1.0" encoding="utf-8"?>
+<p:notes xmlns:a="http://schemas.openxmlformats.org/drawingml/2006/main" xmlns:r="http://schemas.openxmlformats.org/officeDocument/2006/relationships" xmlns:p="http://schemas.openxmlformats.org/presentationml/2006/main">
+  <p:cSld>
+    <p:spTree>
+      <p:nvGrpSpPr>
+        <p:cNvPr id="1" name=""/>
+        <p:cNvGrpSpPr/>
+        <p:nvPr/>
+      </p:nvGrpSpPr>
+      <p:grpSpPr>
+        <a:xfrm>
+          <a:off x="0" y="0"/>
+          <a:ext cx="0" cy="0"/>
+          <a:chOff x="0" y="0"/>
+          <a:chExt cx="0" cy="0"/>
+        </a:xfrm>
+      </p:grpSpPr>
+      <p:sp>
+        <p:nvSpPr>
+          <p:cNvPr id="2" name="Slide Image Placeholder 1"/>
+          <p:cNvSpPr>
+            <a:spLocks noGrp="1" noRot="1" noChangeAspect="1"/>
+          </p:cNvSpPr>
+          <p:nvPr>
+            <p:ph type="sldImg"/>
+          </p:nvPr>
+        </p:nvSpPr>
         <p:spPr>
           <a:xfrm>
             <a:off x="685800" y="1143000"/>
@@ -2491,190 +2709,6 @@
 </p:notes>
 </file>
 
-<file path=ppt/notesSlides/notesSlide4.xml><?xml version="1.0" encoding="utf-8"?>
-<p:notes xmlns:a="http://schemas.openxmlformats.org/drawingml/2006/main" xmlns:r="http://schemas.openxmlformats.org/officeDocument/2006/relationships" xmlns:p="http://schemas.openxmlformats.org/presentationml/2006/main">
-  <p:cSld>
-    <p:spTree>
-      <p:nvGrpSpPr>
-        <p:cNvPr id="1" name=""/>
-        <p:cNvGrpSpPr/>
-        <p:nvPr/>
-      </p:nvGrpSpPr>
-      <p:grpSpPr>
-        <a:xfrm>
-          <a:off x="0" y="0"/>
-          <a:ext cx="0" cy="0"/>
-          <a:chOff x="0" y="0"/>
-          <a:chExt cx="0" cy="0"/>
-        </a:xfrm>
-      </p:grpSpPr>
-      <p:sp>
-        <p:nvSpPr>
-          <p:cNvPr id="2" name="Slide Image Placeholder 1"/>
-          <p:cNvSpPr>
-            <a:spLocks noGrp="1" noRot="1" noChangeAspect="1"/>
-          </p:cNvSpPr>
-          <p:nvPr>
-            <p:ph type="sldImg"/>
-          </p:nvPr>
-        </p:nvSpPr>
-        <p:spPr/>
-      </p:sp>
-      <p:sp>
-        <p:nvSpPr>
-          <p:cNvPr id="3" name="Notes Placeholder 2"/>
-          <p:cNvSpPr>
-            <a:spLocks noGrp="1"/>
-          </p:cNvSpPr>
-          <p:nvPr>
-            <p:ph type="body" idx="1"/>
-          </p:nvPr>
-        </p:nvSpPr>
-        <p:spPr/>
-        <p:txBody>
-          <a:bodyPr/>
-          <a:lstStyle/>
-          <a:p>
-            <a:pPr rtl="0"/>
-            <a:r>
-              <a:rPr lang="en-US" sz="1200" b="0" i="0" u="none" strike="noStrike" kern="1200" dirty="0">
-                <a:solidFill>
-                  <a:schemeClr val="tx1"/>
-                </a:solidFill>
-                <a:effectLst/>
-                <a:latin typeface="+mn-lt"/>
-                <a:ea typeface="+mn-ea"/>
-                <a:cs typeface="+mn-cs"/>
-              </a:rPr>
-              <a:t>First proposed by Michael Nygard (consultant, author, speaker), Architectural Decision Records provide a way to capture these decisions as part of the codebase that's being working on; where the rubber meets the road.</a:t>
-            </a:r>
-          </a:p>
-          <a:p>
-            <a:pPr rtl="0"/>
-            <a:endParaRPr lang="en-US" sz="1200" b="0" i="0" u="none" strike="noStrike" kern="1200" dirty="0">
-              <a:solidFill>
-                <a:schemeClr val="tx1"/>
-              </a:solidFill>
-              <a:effectLst/>
-              <a:latin typeface="+mn-lt"/>
-              <a:ea typeface="+mn-ea"/>
-              <a:cs typeface="+mn-cs"/>
-            </a:endParaRPr>
-          </a:p>
-          <a:p>
-            <a:pPr rtl="0"/>
-            <a:r>
-              <a:rPr lang="en-US" sz="1200" b="0" i="0" u="none" strike="noStrike" kern="1200" dirty="0">
-                <a:solidFill>
-                  <a:schemeClr val="tx1"/>
-                </a:solidFill>
-                <a:effectLst/>
-                <a:latin typeface="+mn-lt"/>
-                <a:ea typeface="+mn-ea"/>
-                <a:cs typeface="+mn-cs"/>
-              </a:rPr>
-              <a:t>There’s a special case for decisions that span projects or the entire enterprise, I’ll get to that in a few minutes.</a:t>
-            </a:r>
-            <a:endParaRPr lang="en-US" dirty="0"/>
-          </a:p>
-          <a:p>
-            <a:endParaRPr lang="en-US" dirty="0"/>
-          </a:p>
-          <a:p>
-            <a:pPr rtl="0"/>
-            <a:r>
-              <a:rPr lang="en-US" sz="1200" b="0" i="0" u="none" strike="noStrike" kern="1200" dirty="0">
-                <a:solidFill>
-                  <a:schemeClr val="tx1"/>
-                </a:solidFill>
-                <a:effectLst/>
-                <a:latin typeface="+mn-lt"/>
-                <a:ea typeface="+mn-ea"/>
-                <a:cs typeface="+mn-cs"/>
-              </a:rPr>
-              <a:t>- Lightweight, text based solution, usually written in Markdown</a:t>
-            </a:r>
-          </a:p>
-          <a:p>
-            <a:pPr rtl="0"/>
-            <a:r>
-              <a:rPr lang="en-US" sz="1200" b="0" i="0" u="none" strike="noStrike" kern="1200" dirty="0">
-                <a:solidFill>
-                  <a:schemeClr val="tx1"/>
-                </a:solidFill>
-                <a:effectLst/>
-                <a:latin typeface="+mn-lt"/>
-                <a:ea typeface="+mn-ea"/>
-                <a:cs typeface="+mn-cs"/>
-              </a:rPr>
-              <a:t>Markdown allows "pretty" rendering when used with </a:t>
-            </a:r>
-            <a:r>
-              <a:rPr lang="en-US" sz="1200" b="0" i="0" u="none" strike="noStrike" kern="1200" dirty="0" err="1">
-                <a:solidFill>
-                  <a:schemeClr val="tx1"/>
-                </a:solidFill>
-                <a:effectLst/>
-                <a:latin typeface="+mn-lt"/>
-                <a:ea typeface="+mn-ea"/>
-                <a:cs typeface="+mn-cs"/>
-              </a:rPr>
-              <a:t>Github</a:t>
-            </a:r>
-            <a:r>
-              <a:rPr lang="en-US" sz="1200" b="0" i="0" u="none" strike="noStrike" kern="1200" dirty="0">
-                <a:solidFill>
-                  <a:schemeClr val="tx1"/>
-                </a:solidFill>
-                <a:effectLst/>
-                <a:latin typeface="+mn-lt"/>
-                <a:ea typeface="+mn-ea"/>
-                <a:cs typeface="+mn-cs"/>
-              </a:rPr>
-              <a:t>, Gitlab &amp; others, still human readable</a:t>
-            </a:r>
-          </a:p>
-          <a:p>
-            <a:endParaRPr lang="en-US" dirty="0"/>
-          </a:p>
-        </p:txBody>
-      </p:sp>
-      <p:sp>
-        <p:nvSpPr>
-          <p:cNvPr id="4" name="Slide Number Placeholder 3"/>
-          <p:cNvSpPr>
-            <a:spLocks noGrp="1"/>
-          </p:cNvSpPr>
-          <p:nvPr>
-            <p:ph type="sldNum" sz="quarter" idx="5"/>
-          </p:nvPr>
-        </p:nvSpPr>
-        <p:spPr/>
-        <p:txBody>
-          <a:bodyPr/>
-          <a:lstStyle/>
-          <a:p>
-            <a:fld id="{E42DF656-43DD-C647-8193-729F56EE6E13}" type="slidenum">
-              <a:rPr lang="en-US" smtClean="0"/>
-              <a:t>5</a:t>
-            </a:fld>
-            <a:endParaRPr lang="en-US"/>
-          </a:p>
-        </p:txBody>
-      </p:sp>
-    </p:spTree>
-    <p:extLst>
-      <p:ext uri="{BB962C8B-B14F-4D97-AF65-F5344CB8AC3E}">
-        <p14:creationId xmlns:p14="http://schemas.microsoft.com/office/powerpoint/2010/main" val="1426769949"/>
-      </p:ext>
-    </p:extLst>
-  </p:cSld>
-  <p:clrMapOvr>
-    <a:masterClrMapping/>
-  </p:clrMapOvr>
-</p:notes>
-</file>
-
 <file path=ppt/notesSlides/notesSlide5.xml><?xml version="1.0" encoding="utf-8"?>
 <p:notes xmlns:a="http://schemas.openxmlformats.org/drawingml/2006/main" xmlns:r="http://schemas.openxmlformats.org/officeDocument/2006/relationships" xmlns:p="http://schemas.openxmlformats.org/presentationml/2006/main">
   <p:cSld>
@@ -2720,6 +2754,21 @@
           <a:lstStyle/>
           <a:p>
             <a:pPr rtl="0"/>
+            <a:r>
+              <a:rPr lang="en-US" sz="1200" b="0" i="0" u="none" strike="noStrike" kern="1200" dirty="0">
+                <a:solidFill>
+                  <a:schemeClr val="tx1"/>
+                </a:solidFill>
+                <a:effectLst/>
+                <a:latin typeface="+mn-lt"/>
+                <a:ea typeface="+mn-ea"/>
+                <a:cs typeface="+mn-cs"/>
+              </a:rPr>
+              <a:t>First proposed by Michael Nygard (consultant, author, speaker), Architectural Decision Records provide a way to capture these decisions as part of the codebase that's being working on; where the rubber meets the road.</a:t>
+            </a:r>
+          </a:p>
+          <a:p>
+            <a:pPr rtl="0"/>
             <a:endParaRPr lang="en-US" sz="1200" b="0" i="0" u="none" strike="noStrike" kern="1200" dirty="0">
               <a:solidFill>
                 <a:schemeClr val="tx1"/>
@@ -2730,6 +2779,106 @@
               <a:cs typeface="+mn-cs"/>
             </a:endParaRPr>
           </a:p>
+          <a:p>
+            <a:pPr marL="0" marR="0" lvl="0" indent="0" algn="l" defTabSz="914400" rtl="0" eaLnBrk="1" fontAlgn="auto" latinLnBrk="0" hangingPunct="1">
+              <a:lnSpc>
+                <a:spcPct val="100000"/>
+              </a:lnSpc>
+              <a:spcBef>
+                <a:spcPts val="0"/>
+              </a:spcBef>
+              <a:spcAft>
+                <a:spcPts val="0"/>
+              </a:spcAft>
+              <a:buClrTx/>
+              <a:buSzTx/>
+              <a:buFontTx/>
+              <a:buNone/>
+              <a:tabLst/>
+              <a:defRPr/>
+            </a:pPr>
+            <a:r>
+              <a:rPr lang="en-US" dirty="0"/>
+              <a:t>In the blog post introducing ADRs, Michael said: “</a:t>
+            </a:r>
+            <a:r>
+              <a:rPr lang="en-US" i="1" dirty="0">
+                <a:solidFill>
+                  <a:schemeClr val="bg1"/>
+                </a:solidFill>
+              </a:rPr>
+              <a:t>“Large documents are never kept up to date. Small, modular documents have at least a chance at being updated.” </a:t>
+            </a:r>
+            <a:r>
+              <a:rPr lang="en-US" i="0" dirty="0">
+                <a:solidFill>
+                  <a:schemeClr val="bg1"/>
+                </a:solidFill>
+              </a:rPr>
+              <a:t>And he’s right.</a:t>
+            </a:r>
+            <a:endParaRPr lang="en-US" dirty="0"/>
+          </a:p>
+          <a:p>
+            <a:endParaRPr lang="en-US" dirty="0"/>
+          </a:p>
+          <a:p>
+            <a:pPr rtl="0"/>
+            <a:r>
+              <a:rPr lang="en-US" sz="1200" b="0" i="0" u="none" strike="noStrike" kern="1200" dirty="0">
+                <a:solidFill>
+                  <a:schemeClr val="tx1"/>
+                </a:solidFill>
+                <a:effectLst/>
+                <a:latin typeface="+mn-lt"/>
+                <a:ea typeface="+mn-ea"/>
+                <a:cs typeface="+mn-cs"/>
+              </a:rPr>
+              <a:t>- Lightweight, text based solution, usually written in Markdown</a:t>
+            </a:r>
+          </a:p>
+          <a:p>
+            <a:pPr rtl="0"/>
+            <a:r>
+              <a:rPr lang="en-US" sz="1200" b="0" i="0" u="none" strike="noStrike" kern="1200" dirty="0">
+                <a:solidFill>
+                  <a:schemeClr val="tx1"/>
+                </a:solidFill>
+                <a:effectLst/>
+                <a:latin typeface="+mn-lt"/>
+                <a:ea typeface="+mn-ea"/>
+                <a:cs typeface="+mn-cs"/>
+              </a:rPr>
+              <a:t>Markdown allows "pretty" rendering when used with </a:t>
+            </a:r>
+            <a:r>
+              <a:rPr lang="en-US" sz="1200" b="0" i="0" u="none" strike="noStrike" kern="1200" dirty="0" err="1">
+                <a:solidFill>
+                  <a:schemeClr val="tx1"/>
+                </a:solidFill>
+                <a:effectLst/>
+                <a:latin typeface="+mn-lt"/>
+                <a:ea typeface="+mn-ea"/>
+                <a:cs typeface="+mn-cs"/>
+              </a:rPr>
+              <a:t>Github</a:t>
+            </a:r>
+            <a:r>
+              <a:rPr lang="en-US" sz="1200" b="0" i="0" u="none" strike="noStrike" kern="1200" dirty="0">
+                <a:solidFill>
+                  <a:schemeClr val="tx1"/>
+                </a:solidFill>
+                <a:effectLst/>
+                <a:latin typeface="+mn-lt"/>
+                <a:ea typeface="+mn-ea"/>
+                <a:cs typeface="+mn-cs"/>
+              </a:rPr>
+              <a:t>, Gitlab &amp; others, still human readable</a:t>
+            </a:r>
+          </a:p>
+          <a:p>
+            <a:endParaRPr lang="en-US" dirty="0"/>
+          </a:p>
         </p:txBody>
       </p:sp>
       <p:sp>
@@ -2749,7 +2898,7 @@
           <a:p>
             <a:fld id="{E42DF656-43DD-C647-8193-729F56EE6E13}" type="slidenum">
               <a:rPr lang="en-US" smtClean="0"/>
-              <a:t>6</a:t>
+              <a:t>5</a:t>
             </a:fld>
             <a:endParaRPr lang="en-US"/>
           </a:p>
@@ -2758,7 +2907,7 @@
     </p:spTree>
     <p:extLst>
       <p:ext uri="{BB962C8B-B14F-4D97-AF65-F5344CB8AC3E}">
-        <p14:creationId xmlns:p14="http://schemas.microsoft.com/office/powerpoint/2010/main" val="4233849582"/>
+        <p14:creationId xmlns:p14="http://schemas.microsoft.com/office/powerpoint/2010/main" val="1426769949"/>
       </p:ext>
     </p:extLst>
   </p:cSld>
@@ -2896,7 +3045,7 @@
           <a:p>
             <a:fld id="{096F4AFB-61BD-1340-90B6-0FECED04B0A2}" type="slidenum">
               <a:rPr lang="en-US" smtClean="0"/>
-              <a:t>7</a:t>
+              <a:t>6</a:t>
             </a:fld>
             <a:endParaRPr lang="en-US"/>
           </a:p>
@@ -2988,7 +3137,7 @@
           <a:p>
             <a:fld id="{096F4AFB-61BD-1340-90B6-0FECED04B0A2}" type="slidenum">
               <a:rPr lang="en-US" smtClean="0"/>
-              <a:t>8</a:t>
+              <a:t>7</a:t>
             </a:fld>
             <a:endParaRPr lang="en-US"/>
           </a:p>
@@ -3155,7 +3304,7 @@
           <a:p>
             <a:fld id="{096F4AFB-61BD-1340-90B6-0FECED04B0A2}" type="slidenum">
               <a:rPr lang="en-US" smtClean="0"/>
-              <a:t>9</a:t>
+              <a:t>8</a:t>
             </a:fld>
             <a:endParaRPr lang="en-US"/>
           </a:p>
@@ -3376,7 +3525,7 @@
           <a:p>
             <a:fld id="{096F4AFB-61BD-1340-90B6-0FECED04B0A2}" type="slidenum">
               <a:rPr lang="en-US" smtClean="0"/>
-              <a:t>10</a:t>
+              <a:t>9</a:t>
             </a:fld>
             <a:endParaRPr lang="en-US"/>
           </a:p>
@@ -6734,7 +6883,7 @@
         </p:nvGrpSpPr>
         <p:grpSpPr>
           <a:xfrm>
-            <a:off x="7863501" y="914391"/>
+            <a:off x="7422063" y="819797"/>
             <a:ext cx="4006187" cy="962571"/>
             <a:chOff x="6318469" y="914391"/>
             <a:chExt cx="4006187" cy="962571"/>
@@ -6755,7 +6904,7 @@
             <p:nvPr/>
           </p:nvPicPr>
           <p:blipFill>
-            <a:blip r:embed="rId2">
+            <a:blip r:embed="rId3">
               <a:clrChange>
                 <a:clrFrom>
                   <a:srgbClr val="282F36">
@@ -6799,7 +6948,7 @@
           <p:spPr>
             <a:xfrm>
               <a:off x="7267898" y="1173833"/>
-              <a:ext cx="3056758" cy="369332"/>
+              <a:ext cx="3056758" cy="461665"/>
             </a:xfrm>
             <a:prstGeom prst="rect">
               <a:avLst/>
@@ -6813,7 +6962,7 @@
             <a:lstStyle/>
             <a:p>
               <a:r>
-                <a:rPr lang="en-US" dirty="0">
+                <a:rPr lang="en-US" sz="2400" dirty="0">
                   <a:solidFill>
                     <a:schemeClr val="bg1"/>
                   </a:solidFill>
@@ -6821,14 +6970,14 @@
                 <a:t>@</a:t>
               </a:r>
               <a:r>
-                <a:rPr lang="en-US" dirty="0" err="1">
+                <a:rPr lang="en-US" sz="2400" dirty="0" err="1">
                   <a:solidFill>
                     <a:schemeClr val="bg1"/>
                   </a:solidFill>
                 </a:rPr>
                 <a:t>iamagiantnerd</a:t>
               </a:r>
-              <a:endParaRPr lang="en-US" dirty="0">
+              <a:endParaRPr lang="en-US" sz="2400" dirty="0">
                 <a:solidFill>
                   <a:schemeClr val="bg1"/>
                 </a:solidFill>
@@ -7193,13 +7342,13 @@
         </p:nvPicPr>
         <p:blipFill rotWithShape="1">
           <a:blip r:embed="rId4"/>
-          <a:srcRect t="14410" b="72687"/>
+          <a:srcRect t="27313" b="36774"/>
           <a:stretch/>
         </p:blipFill>
         <p:spPr>
           <a:xfrm>
-            <a:off x="2202831" y="988142"/>
-            <a:ext cx="7786339" cy="884903"/>
+            <a:off x="2202831" y="1873044"/>
+            <a:ext cx="7786339" cy="2462981"/>
           </a:xfrm>
           <a:prstGeom prst="rect">
             <a:avLst/>
@@ -7220,8 +7369,8 @@
         </p:nvSpPr>
         <p:spPr>
           <a:xfrm>
-            <a:off x="5592523" y="824016"/>
-            <a:ext cx="1556836" cy="769441"/>
+            <a:off x="7996510" y="1805415"/>
+            <a:ext cx="2105063" cy="769441"/>
           </a:xfrm>
           <a:prstGeom prst="rect">
             <a:avLst/>
@@ -7236,7 +7385,7 @@
           <a:p>
             <a:r>
               <a:rPr lang="en-US" sz="4400" dirty="0"/>
-              <a:t>Status</a:t>
+              <a:t>Context</a:t>
             </a:r>
           </a:p>
         </p:txBody>
@@ -7255,7 +7404,7 @@
         </p:nvSpPr>
         <p:spPr>
           <a:xfrm>
-            <a:off x="3536342" y="544429"/>
+            <a:off x="5969826" y="1525828"/>
             <a:ext cx="1917291" cy="1328616"/>
           </a:xfrm>
           <a:prstGeom prst="leftArrow">
@@ -7290,7 +7439,7 @@
     </p:spTree>
     <p:extLst>
       <p:ext uri="{BB962C8B-B14F-4D97-AF65-F5344CB8AC3E}">
-        <p14:creationId xmlns:p14="http://schemas.microsoft.com/office/powerpoint/2010/main" val="982979819"/>
+        <p14:creationId xmlns:p14="http://schemas.microsoft.com/office/powerpoint/2010/main" val="2698434900"/>
       </p:ext>
     </p:extLst>
   </p:cSld>
@@ -7375,13 +7524,13 @@
         </p:nvPicPr>
         <p:blipFill rotWithShape="1">
           <a:blip r:embed="rId4"/>
-          <a:srcRect t="27313" b="36774"/>
+          <a:srcRect t="63871" b="24086"/>
           <a:stretch/>
         </p:blipFill>
         <p:spPr>
           <a:xfrm>
-            <a:off x="2202831" y="1873044"/>
-            <a:ext cx="7786339" cy="2462981"/>
+            <a:off x="2202831" y="4380271"/>
+            <a:ext cx="7786339" cy="825910"/>
           </a:xfrm>
           <a:prstGeom prst="rect">
             <a:avLst/>
@@ -7402,8 +7551,8 @@
         </p:nvSpPr>
         <p:spPr>
           <a:xfrm>
-            <a:off x="7996510" y="1805415"/>
-            <a:ext cx="2105063" cy="769441"/>
+            <a:off x="5563026" y="2875789"/>
+            <a:ext cx="2182008" cy="769441"/>
           </a:xfrm>
           <a:prstGeom prst="rect">
             <a:avLst/>
@@ -7418,7 +7567,7 @@
           <a:p>
             <a:r>
               <a:rPr lang="en-US" sz="4400" dirty="0"/>
-              <a:t>Context</a:t>
+              <a:t>Decision</a:t>
             </a:r>
           </a:p>
         </p:txBody>
@@ -7436,8 +7585,8 @@
           <p:nvPr/>
         </p:nvSpPr>
         <p:spPr>
-          <a:xfrm>
-            <a:off x="5969826" y="1525828"/>
+          <a:xfrm rot="19817367">
+            <a:off x="3728072" y="3263582"/>
             <a:ext cx="1917291" cy="1328616"/>
           </a:xfrm>
           <a:prstGeom prst="leftArrow">
@@ -7472,7 +7621,7 @@
     </p:spTree>
     <p:extLst>
       <p:ext uri="{BB962C8B-B14F-4D97-AF65-F5344CB8AC3E}">
-        <p14:creationId xmlns:p14="http://schemas.microsoft.com/office/powerpoint/2010/main" val="2698434900"/>
+        <p14:creationId xmlns:p14="http://schemas.microsoft.com/office/powerpoint/2010/main" val="3289402013"/>
       </p:ext>
     </p:extLst>
   </p:cSld>
@@ -7557,13 +7706,13 @@
         </p:nvPicPr>
         <p:blipFill rotWithShape="1">
           <a:blip r:embed="rId4"/>
-          <a:srcRect t="63871" b="24086"/>
+          <a:srcRect t="76560" b="2365"/>
           <a:stretch/>
         </p:blipFill>
         <p:spPr>
           <a:xfrm>
-            <a:off x="2202831" y="4380271"/>
-            <a:ext cx="7786339" cy="825910"/>
+            <a:off x="2202831" y="5250426"/>
+            <a:ext cx="7786339" cy="1445341"/>
           </a:xfrm>
           <a:prstGeom prst="rect">
             <a:avLst/>
@@ -7584,8 +7733,8 @@
         </p:nvSpPr>
         <p:spPr>
           <a:xfrm>
-            <a:off x="5563026" y="2875789"/>
-            <a:ext cx="2182008" cy="769441"/>
+            <a:off x="6096000" y="3880942"/>
+            <a:ext cx="3515706" cy="769441"/>
           </a:xfrm>
           <a:prstGeom prst="rect">
             <a:avLst/>
@@ -7600,7 +7749,7 @@
           <a:p>
             <a:r>
               <a:rPr lang="en-US" sz="4400" dirty="0"/>
-              <a:t>Decision</a:t>
+              <a:t>Consequences</a:t>
             </a:r>
           </a:p>
         </p:txBody>
@@ -7619,7 +7768,7 @@
         </p:nvSpPr>
         <p:spPr>
           <a:xfrm rot="19817367">
-            <a:off x="3728072" y="3263582"/>
+            <a:off x="3975489" y="4170607"/>
             <a:ext cx="1917291" cy="1328616"/>
           </a:xfrm>
           <a:prstGeom prst="leftArrow">
@@ -7654,7 +7803,7 @@
     </p:spTree>
     <p:extLst>
       <p:ext uri="{BB962C8B-B14F-4D97-AF65-F5344CB8AC3E}">
-        <p14:creationId xmlns:p14="http://schemas.microsoft.com/office/powerpoint/2010/main" val="3289402013"/>
+        <p14:creationId xmlns:p14="http://schemas.microsoft.com/office/powerpoint/2010/main" val="3896413311"/>
       </p:ext>
     </p:extLst>
   </p:cSld>
@@ -7681,93 +7830,22 @@
           <a:chExt cx="0" cy="0"/>
         </a:xfrm>
       </p:grpSpPr>
-      <p:pic>
-        <p:nvPicPr>
-          <p:cNvPr id="4" name="Picture 3">
-            <a:extLst>
-              <a:ext uri="{FF2B5EF4-FFF2-40B4-BE49-F238E27FC236}">
-                <a16:creationId xmlns:a16="http://schemas.microsoft.com/office/drawing/2014/main" id="{B66986D0-EB48-794D-BB7E-C84315408B86}"/>
-              </a:ext>
-            </a:extLst>
-          </p:cNvPr>
-          <p:cNvPicPr>
-            <a:picLocks noChangeAspect="1"/>
-          </p:cNvPicPr>
+      <p:sp>
+        <p:nvSpPr>
+          <p:cNvPr id="4" name="TextBox 3">
+            <a:extLst>
+              <a:ext uri="{FF2B5EF4-FFF2-40B4-BE49-F238E27FC236}">
+                <a16:creationId xmlns:a16="http://schemas.microsoft.com/office/drawing/2014/main" id="{D9E06190-A811-FA4A-8DFF-25F7864A68C3}"/>
+              </a:ext>
+            </a:extLst>
+          </p:cNvPr>
+          <p:cNvSpPr txBox="1"/>
           <p:nvPr/>
-        </p:nvPicPr>
-        <p:blipFill>
-          <a:blip r:embed="rId3">
-            <a:extLst>
-              <a:ext uri="{BEBA8EAE-BF5A-486C-A8C5-ECC9F3942E4B}">
-                <a14:imgProps xmlns:a14="http://schemas.microsoft.com/office/drawing/2010/main">
-                  <a14:imgLayer>
-                    <a14:imgEffect>
-                      <a14:artisticBlur/>
-                    </a14:imgEffect>
-                  </a14:imgLayer>
-                </a14:imgProps>
-              </a:ext>
-            </a:extLst>
-          </a:blip>
-          <a:stretch>
-            <a:fillRect/>
-          </a:stretch>
-        </p:blipFill>
+        </p:nvSpPr>
         <p:spPr>
           <a:xfrm>
-            <a:off x="2202831" y="0"/>
-            <a:ext cx="7786339" cy="6858000"/>
-          </a:xfrm>
-          <a:prstGeom prst="rect">
-            <a:avLst/>
-          </a:prstGeom>
-        </p:spPr>
-      </p:pic>
-      <p:pic>
-        <p:nvPicPr>
-          <p:cNvPr id="2" name="Picture 1">
-            <a:extLst>
-              <a:ext uri="{FF2B5EF4-FFF2-40B4-BE49-F238E27FC236}">
-                <a16:creationId xmlns:a16="http://schemas.microsoft.com/office/drawing/2014/main" id="{BD0230DF-A64A-E947-8F63-21C8D2534883}"/>
-              </a:ext>
-            </a:extLst>
-          </p:cNvPr>
-          <p:cNvPicPr>
-            <a:picLocks noChangeAspect="1"/>
-          </p:cNvPicPr>
-          <p:nvPr/>
-        </p:nvPicPr>
-        <p:blipFill rotWithShape="1">
-          <a:blip r:embed="rId4"/>
-          <a:srcRect t="76560" b="2365"/>
-          <a:stretch/>
-        </p:blipFill>
-        <p:spPr>
-          <a:xfrm>
-            <a:off x="2202831" y="5250426"/>
-            <a:ext cx="7786339" cy="1445341"/>
-          </a:xfrm>
-          <a:prstGeom prst="rect">
-            <a:avLst/>
-          </a:prstGeom>
-        </p:spPr>
-      </p:pic>
-      <p:sp>
-        <p:nvSpPr>
-          <p:cNvPr id="5" name="TextBox 4">
-            <a:extLst>
-              <a:ext uri="{FF2B5EF4-FFF2-40B4-BE49-F238E27FC236}">
-                <a16:creationId xmlns:a16="http://schemas.microsoft.com/office/drawing/2014/main" id="{D84897DD-3562-C143-A690-430146840081}"/>
-              </a:ext>
-            </a:extLst>
-          </p:cNvPr>
-          <p:cNvSpPr txBox="1"/>
-          <p:nvPr/>
-        </p:nvSpPr>
-        <p:spPr>
-          <a:xfrm>
-            <a:off x="6096000" y="3880942"/>
-            <a:ext cx="3515706" cy="769441"/>
+            <a:off x="2855013" y="2515913"/>
+            <a:ext cx="6420026" cy="1754326"/>
           </a:xfrm>
           <a:prstGeom prst="rect">
             <a:avLst/>
@@ -7780,63 +7858,33 @@
           </a:bodyPr>
           <a:lstStyle/>
           <a:p>
-            <a:r>
-              <a:rPr lang="en-US" sz="4400" dirty="0"/>
-              <a:t>Consequences</a:t>
-            </a:r>
-          </a:p>
-        </p:txBody>
-      </p:sp>
-      <p:sp>
-        <p:nvSpPr>
-          <p:cNvPr id="8" name="Left Arrow 7">
-            <a:extLst>
-              <a:ext uri="{FF2B5EF4-FFF2-40B4-BE49-F238E27FC236}">
-                <a16:creationId xmlns:a16="http://schemas.microsoft.com/office/drawing/2014/main" id="{F5BA64AF-9A79-5E4C-8FDC-FB51331AE991}"/>
-              </a:ext>
-            </a:extLst>
-          </p:cNvPr>
-          <p:cNvSpPr/>
-          <p:nvPr/>
-        </p:nvSpPr>
-        <p:spPr>
-          <a:xfrm rot="19817367">
-            <a:off x="3975489" y="4170607"/>
-            <a:ext cx="1917291" cy="1328616"/>
-          </a:xfrm>
-          <a:prstGeom prst="leftArrow">
-            <a:avLst/>
-          </a:prstGeom>
-        </p:spPr>
-        <p:style>
-          <a:lnRef idx="2">
-            <a:schemeClr val="accent1">
-              <a:shade val="50000"/>
-            </a:schemeClr>
-          </a:lnRef>
-          <a:fillRef idx="1">
-            <a:schemeClr val="accent1"/>
-          </a:fillRef>
-          <a:effectRef idx="0">
-            <a:schemeClr val="accent1"/>
-          </a:effectRef>
-          <a:fontRef idx="minor">
-            <a:schemeClr val="lt1"/>
-          </a:fontRef>
-        </p:style>
-        <p:txBody>
-          <a:bodyPr rtlCol="0" anchor="ctr"/>
-          <a:lstStyle/>
-          <a:p>
             <a:pPr algn="ctr"/>
-            <a:endParaRPr lang="en-US"/>
+            <a:r>
+              <a:rPr lang="en-US" sz="5400" dirty="0">
+                <a:solidFill>
+                  <a:schemeClr val="bg1"/>
+                </a:solidFill>
+              </a:rPr>
+              <a:t>Leverage your existing</a:t>
+            </a:r>
+          </a:p>
+          <a:p>
+            <a:pPr algn="ctr"/>
+            <a:r>
+              <a:rPr lang="en-US" sz="5400" dirty="0">
+                <a:solidFill>
+                  <a:schemeClr val="bg1"/>
+                </a:solidFill>
+              </a:rPr>
+              <a:t>workflow!</a:t>
+            </a:r>
           </a:p>
         </p:txBody>
       </p:sp>
     </p:spTree>
     <p:extLst>
       <p:ext uri="{BB962C8B-B14F-4D97-AF65-F5344CB8AC3E}">
-        <p14:creationId xmlns:p14="http://schemas.microsoft.com/office/powerpoint/2010/main" val="3896413311"/>
+        <p14:creationId xmlns:p14="http://schemas.microsoft.com/office/powerpoint/2010/main" val="1655217425"/>
       </p:ext>
     </p:extLst>
   </p:cSld>
@@ -7877,8 +7925,8 @@
         </p:nvSpPr>
         <p:spPr>
           <a:xfrm>
-            <a:off x="2855013" y="2515913"/>
-            <a:ext cx="6420026" cy="1754326"/>
+            <a:off x="2950456" y="2515913"/>
+            <a:ext cx="6229141" cy="1754326"/>
           </a:xfrm>
           <a:prstGeom prst="rect">
             <a:avLst/>
@@ -7898,7 +7946,7 @@
                   <a:schemeClr val="bg1"/>
                 </a:solidFill>
               </a:rPr>
-              <a:t>Leverage your existing</a:t>
+              <a:t>What should require </a:t>
             </a:r>
           </a:p>
           <a:p>
@@ -7909,7 +7957,7 @@
                   <a:schemeClr val="bg1"/>
                 </a:solidFill>
               </a:rPr>
-              <a:t>workflow!</a:t>
+              <a:t>an ADR?</a:t>
             </a:r>
           </a:p>
         </p:txBody>
@@ -7917,7 +7965,7 @@
     </p:spTree>
     <p:extLst>
       <p:ext uri="{BB962C8B-B14F-4D97-AF65-F5344CB8AC3E}">
-        <p14:creationId xmlns:p14="http://schemas.microsoft.com/office/powerpoint/2010/main" val="1655217425"/>
+        <p14:creationId xmlns:p14="http://schemas.microsoft.com/office/powerpoint/2010/main" val="3831942716"/>
       </p:ext>
     </p:extLst>
   </p:cSld>
@@ -7946,51 +7994,36 @@
       </p:grpSpPr>
       <p:sp>
         <p:nvSpPr>
-          <p:cNvPr id="4" name="TextBox 3">
-            <a:extLst>
-              <a:ext uri="{FF2B5EF4-FFF2-40B4-BE49-F238E27FC236}">
-                <a16:creationId xmlns:a16="http://schemas.microsoft.com/office/drawing/2014/main" id="{D9E06190-A811-FA4A-8DFF-25F7864A68C3}"/>
-              </a:ext>
-            </a:extLst>
-          </p:cNvPr>
-          <p:cNvSpPr txBox="1"/>
-          <p:nvPr/>
+          <p:cNvPr id="2" name="Title 1">
+            <a:extLst>
+              <a:ext uri="{FF2B5EF4-FFF2-40B4-BE49-F238E27FC236}">
+                <a16:creationId xmlns:a16="http://schemas.microsoft.com/office/drawing/2014/main" id="{C409FD33-6233-7C49-9918-532E7EC05AB5}"/>
+              </a:ext>
+            </a:extLst>
+          </p:cNvPr>
+          <p:cNvSpPr>
+            <a:spLocks noGrp="1"/>
+          </p:cNvSpPr>
+          <p:nvPr>
+            <p:ph type="title"/>
+          </p:nvPr>
         </p:nvSpPr>
         <p:spPr>
           <a:xfrm>
-            <a:off x="2950456" y="2515913"/>
-            <a:ext cx="6229141" cy="1754326"/>
+            <a:off x="838200" y="2365324"/>
+            <a:ext cx="10515600" cy="2127352"/>
           </a:xfrm>
-          <a:prstGeom prst="rect">
-            <a:avLst/>
-          </a:prstGeom>
-          <a:noFill/>
         </p:spPr>
         <p:txBody>
-          <a:bodyPr wrap="none" rtlCol="0">
-            <a:spAutoFit/>
+          <a:bodyPr>
+            <a:noAutofit/>
           </a:bodyPr>
           <a:lstStyle/>
           <a:p>
             <a:pPr algn="ctr"/>
             <a:r>
-              <a:rPr lang="en-US" sz="5400" dirty="0">
-                <a:solidFill>
-                  <a:schemeClr val="bg1"/>
-                </a:solidFill>
-              </a:rPr>
-              <a:t>What should require </a:t>
-            </a:r>
-          </a:p>
-          <a:p>
-            <a:pPr algn="ctr"/>
-            <a:r>
-              <a:rPr lang="en-US" sz="5400" dirty="0">
-                <a:solidFill>
-                  <a:schemeClr val="bg1"/>
-                </a:solidFill>
-              </a:rPr>
-              <a:t>an ADR?</a:t>
+              <a:rPr lang="en-US" sz="5400" dirty="0"/>
+              <a:t>But what about overarching concerns that apply to more than one project?</a:t>
             </a:r>
           </a:p>
         </p:txBody>
@@ -7998,7 +8031,7 @@
     </p:spTree>
     <p:extLst>
       <p:ext uri="{BB962C8B-B14F-4D97-AF65-F5344CB8AC3E}">
-        <p14:creationId xmlns:p14="http://schemas.microsoft.com/office/powerpoint/2010/main" val="3831942716"/>
+        <p14:creationId xmlns:p14="http://schemas.microsoft.com/office/powerpoint/2010/main" val="2868284583"/>
       </p:ext>
     </p:extLst>
   </p:cSld>
@@ -8027,36 +8060,51 @@
       </p:grpSpPr>
       <p:sp>
         <p:nvSpPr>
-          <p:cNvPr id="2" name="Title 1">
-            <a:extLst>
-              <a:ext uri="{FF2B5EF4-FFF2-40B4-BE49-F238E27FC236}">
-                <a16:creationId xmlns:a16="http://schemas.microsoft.com/office/drawing/2014/main" id="{C409FD33-6233-7C49-9918-532E7EC05AB5}"/>
-              </a:ext>
-            </a:extLst>
-          </p:cNvPr>
-          <p:cNvSpPr>
-            <a:spLocks noGrp="1"/>
-          </p:cNvSpPr>
-          <p:nvPr>
-            <p:ph type="title"/>
-          </p:nvPr>
+          <p:cNvPr id="4" name="TextBox 3">
+            <a:extLst>
+              <a:ext uri="{FF2B5EF4-FFF2-40B4-BE49-F238E27FC236}">
+                <a16:creationId xmlns:a16="http://schemas.microsoft.com/office/drawing/2014/main" id="{D9E06190-A811-FA4A-8DFF-25F7864A68C3}"/>
+              </a:ext>
+            </a:extLst>
+          </p:cNvPr>
+          <p:cNvSpPr txBox="1"/>
+          <p:nvPr/>
         </p:nvSpPr>
         <p:spPr>
           <a:xfrm>
-            <a:off x="838200" y="2365324"/>
-            <a:ext cx="10515600" cy="2127352"/>
+            <a:off x="2928304" y="2159451"/>
+            <a:ext cx="6335452" cy="1754326"/>
           </a:xfrm>
+          <a:prstGeom prst="rect">
+            <a:avLst/>
+          </a:prstGeom>
+          <a:noFill/>
         </p:spPr>
         <p:txBody>
-          <a:bodyPr>
-            <a:noAutofit/>
+          <a:bodyPr wrap="none" rtlCol="0">
+            <a:spAutoFit/>
           </a:bodyPr>
           <a:lstStyle/>
           <a:p>
             <a:pPr algn="ctr"/>
             <a:r>
-              <a:rPr lang="en-US" sz="5400" dirty="0"/>
-              <a:t>But what about overarching concerns that apply to more than one project?</a:t>
+              <a:rPr lang="en-US" sz="5400" dirty="0">
+                <a:solidFill>
+                  <a:schemeClr val="bg1"/>
+                </a:solidFill>
+              </a:rPr>
+              <a:t>Wait, but what about </a:t>
+            </a:r>
+          </a:p>
+          <a:p>
+            <a:pPr algn="ctr"/>
+            <a:r>
+              <a:rPr lang="en-US" sz="5400" dirty="0">
+                <a:solidFill>
+                  <a:schemeClr val="bg1"/>
+                </a:solidFill>
+              </a:rPr>
+              <a:t>Wikis?</a:t>
             </a:r>
           </a:p>
         </p:txBody>
@@ -8064,7 +8112,7 @@
     </p:spTree>
     <p:extLst>
       <p:ext uri="{BB962C8B-B14F-4D97-AF65-F5344CB8AC3E}">
-        <p14:creationId xmlns:p14="http://schemas.microsoft.com/office/powerpoint/2010/main" val="2868284583"/>
+        <p14:creationId xmlns:p14="http://schemas.microsoft.com/office/powerpoint/2010/main" val="3070033270"/>
       </p:ext>
     </p:extLst>
   </p:cSld>
@@ -8093,59 +8141,157 @@
       </p:grpSpPr>
       <p:sp>
         <p:nvSpPr>
-          <p:cNvPr id="4" name="TextBox 3">
-            <a:extLst>
-              <a:ext uri="{FF2B5EF4-FFF2-40B4-BE49-F238E27FC236}">
-                <a16:creationId xmlns:a16="http://schemas.microsoft.com/office/drawing/2014/main" id="{D9E06190-A811-FA4A-8DFF-25F7864A68C3}"/>
-              </a:ext>
-            </a:extLst>
-          </p:cNvPr>
-          <p:cNvSpPr txBox="1"/>
-          <p:nvPr/>
+          <p:cNvPr id="2" name="Title 1">
+            <a:extLst>
+              <a:ext uri="{FF2B5EF4-FFF2-40B4-BE49-F238E27FC236}">
+                <a16:creationId xmlns:a16="http://schemas.microsoft.com/office/drawing/2014/main" id="{CF233AD3-CDB6-CE4C-A630-82980BA1D0E8}"/>
+              </a:ext>
+            </a:extLst>
+          </p:cNvPr>
+          <p:cNvSpPr>
+            <a:spLocks noGrp="1"/>
+          </p:cNvSpPr>
+          <p:nvPr>
+            <p:ph type="title"/>
+          </p:nvPr>
         </p:nvSpPr>
         <p:spPr>
           <a:xfrm>
-            <a:off x="2928304" y="2159451"/>
-            <a:ext cx="6335452" cy="1754326"/>
+            <a:off x="831850" y="914399"/>
+            <a:ext cx="10515600" cy="1596326"/>
+          </a:xfrm>
+        </p:spPr>
+        <p:txBody>
+          <a:bodyPr>
+            <a:normAutofit/>
+          </a:bodyPr>
+          <a:lstStyle/>
+          <a:p>
+            <a:pPr algn="ctr"/>
+            <a:r>
+              <a:rPr lang="en-US" sz="8000" b="1" dirty="0">
+                <a:solidFill>
+                  <a:schemeClr val="accent4"/>
+                </a:solidFill>
+              </a:rPr>
+              <a:t>The Benefits</a:t>
+            </a:r>
+          </a:p>
+        </p:txBody>
+      </p:sp>
+      <p:sp>
+        <p:nvSpPr>
+          <p:cNvPr id="3" name="Text Placeholder 2">
+            <a:extLst>
+              <a:ext uri="{FF2B5EF4-FFF2-40B4-BE49-F238E27FC236}">
+                <a16:creationId xmlns:a16="http://schemas.microsoft.com/office/drawing/2014/main" id="{F3EFA1D7-5C02-5C46-8D14-AC78C6316567}"/>
+              </a:ext>
+            </a:extLst>
+          </p:cNvPr>
+          <p:cNvSpPr>
+            <a:spLocks noGrp="1"/>
+          </p:cNvSpPr>
+          <p:nvPr>
+            <p:ph type="body" idx="1"/>
+          </p:nvPr>
+        </p:nvSpPr>
+        <p:spPr>
+          <a:xfrm>
+            <a:off x="1747595" y="3225612"/>
+            <a:ext cx="8684109" cy="1500187"/>
+          </a:xfrm>
+        </p:spPr>
+        <p:txBody>
+          <a:bodyPr/>
+          <a:lstStyle/>
+          <a:p>
+            <a:pPr fontAlgn="base"/>
+            <a:r>
+              <a:rPr lang="en-US" i="1" dirty="0">
+                <a:solidFill>
+                  <a:schemeClr val="bg1"/>
+                </a:solidFill>
+              </a:rPr>
+              <a:t>“Incorrect documentation is often worse than no documentation.”</a:t>
+            </a:r>
+          </a:p>
+          <a:p>
+            <a:pPr fontAlgn="base"/>
+            <a:r>
+              <a:rPr lang="en-US" dirty="0">
+                <a:solidFill>
+                  <a:schemeClr val="bg1"/>
+                </a:solidFill>
+              </a:rPr>
+              <a:t>— Bertrand Meyer</a:t>
+            </a:r>
+          </a:p>
+        </p:txBody>
+      </p:sp>
+      <p:sp>
+        <p:nvSpPr>
+          <p:cNvPr id="4" name="Title 1">
+            <a:extLst>
+              <a:ext uri="{FF2B5EF4-FFF2-40B4-BE49-F238E27FC236}">
+                <a16:creationId xmlns:a16="http://schemas.microsoft.com/office/drawing/2014/main" id="{E5E145E0-8A6D-BA43-ABD6-2C9CAE44E411}"/>
+              </a:ext>
+            </a:extLst>
+          </p:cNvPr>
+          <p:cNvSpPr txBox="1">
+            <a:spLocks/>
+          </p:cNvSpPr>
+          <p:nvPr/>
+        </p:nvSpPr>
+        <p:spPr>
+          <a:xfrm>
+            <a:off x="838200" y="4162593"/>
+            <a:ext cx="10515600" cy="2127352"/>
           </a:xfrm>
           <a:prstGeom prst="rect">
             <a:avLst/>
           </a:prstGeom>
-          <a:noFill/>
         </p:spPr>
         <p:txBody>
-          <a:bodyPr wrap="none" rtlCol="0">
-            <a:spAutoFit/>
+          <a:bodyPr vert="horz" lIns="91440" tIns="45720" rIns="91440" bIns="45720" rtlCol="0" anchor="b">
+            <a:noAutofit/>
           </a:bodyPr>
-          <a:lstStyle/>
+          <a:lstStyle>
+            <a:lvl1pPr algn="l" defTabSz="914400" rtl="0" eaLnBrk="1" latinLnBrk="0" hangingPunct="1">
+              <a:lnSpc>
+                <a:spcPct val="90000"/>
+              </a:lnSpc>
+              <a:spcBef>
+                <a:spcPct val="0"/>
+              </a:spcBef>
+              <a:buNone/>
+              <a:defRPr sz="6000" kern="1200">
+                <a:solidFill>
+                  <a:schemeClr val="bg1"/>
+                </a:solidFill>
+                <a:latin typeface="+mj-lt"/>
+                <a:ea typeface="+mj-ea"/>
+                <a:cs typeface="+mj-cs"/>
+              </a:defRPr>
+            </a:lvl1pPr>
+          </a:lstStyle>
           <a:p>
             <a:pPr algn="ctr"/>
             <a:r>
-              <a:rPr lang="en-US" sz="5400" dirty="0">
-                <a:solidFill>
-                  <a:schemeClr val="bg1"/>
-                </a:solidFill>
-              </a:rPr>
-              <a:t>Wait, but what about </a:t>
-            </a:r>
-          </a:p>
-          <a:p>
-            <a:pPr algn="ctr"/>
-            <a:r>
-              <a:rPr lang="en-US" sz="5400" dirty="0">
-                <a:solidFill>
-                  <a:schemeClr val="bg1"/>
-                </a:solidFill>
-              </a:rPr>
-              <a:t>Wikis?</a:t>
-            </a:r>
+              <a:rPr lang="en-US" sz="6600"/>
+              <a:t>ADRs = </a:t>
+            </a:r>
+            <a:r>
+              <a:rPr lang="en-US" sz="9600"/>
+              <a:t>👍🏽</a:t>
+            </a:r>
+            <a:endParaRPr lang="en-US" sz="9600" dirty="0"/>
           </a:p>
         </p:txBody>
       </p:sp>
     </p:spTree>
     <p:extLst>
       <p:ext uri="{BB962C8B-B14F-4D97-AF65-F5344CB8AC3E}">
-        <p14:creationId xmlns:p14="http://schemas.microsoft.com/office/powerpoint/2010/main" val="3070033270"/>
+        <p14:creationId xmlns:p14="http://schemas.microsoft.com/office/powerpoint/2010/main" val="2346709893"/>
       </p:ext>
     </p:extLst>
   </p:cSld>
@@ -8174,157 +8320,79 @@
       </p:grpSpPr>
       <p:sp>
         <p:nvSpPr>
-          <p:cNvPr id="2" name="Title 1">
-            <a:extLst>
-              <a:ext uri="{FF2B5EF4-FFF2-40B4-BE49-F238E27FC236}">
-                <a16:creationId xmlns:a16="http://schemas.microsoft.com/office/drawing/2014/main" id="{CF233AD3-CDB6-CE4C-A630-82980BA1D0E8}"/>
-              </a:ext>
-            </a:extLst>
-          </p:cNvPr>
-          <p:cNvSpPr>
-            <a:spLocks noGrp="1"/>
-          </p:cNvSpPr>
-          <p:nvPr>
-            <p:ph type="title"/>
-          </p:nvPr>
+          <p:cNvPr id="4" name="TextBox 3">
+            <a:extLst>
+              <a:ext uri="{FF2B5EF4-FFF2-40B4-BE49-F238E27FC236}">
+                <a16:creationId xmlns:a16="http://schemas.microsoft.com/office/drawing/2014/main" id="{D9E06190-A811-FA4A-8DFF-25F7864A68C3}"/>
+              </a:ext>
+            </a:extLst>
+          </p:cNvPr>
+          <p:cNvSpPr txBox="1"/>
+          <p:nvPr/>
         </p:nvSpPr>
         <p:spPr>
           <a:xfrm>
-            <a:off x="831850" y="914399"/>
-            <a:ext cx="10515600" cy="1596326"/>
-          </a:xfrm>
-        </p:spPr>
-        <p:txBody>
-          <a:bodyPr>
-            <a:normAutofit/>
-          </a:bodyPr>
-          <a:lstStyle/>
-          <a:p>
-            <a:pPr algn="ctr"/>
-            <a:r>
-              <a:rPr lang="en-US" sz="8000" b="1" dirty="0">
-                <a:solidFill>
-                  <a:schemeClr val="accent4"/>
-                </a:solidFill>
-              </a:rPr>
-              <a:t>The Benefits</a:t>
-            </a:r>
-          </a:p>
-        </p:txBody>
-      </p:sp>
-      <p:sp>
-        <p:nvSpPr>
-          <p:cNvPr id="3" name="Text Placeholder 2">
-            <a:extLst>
-              <a:ext uri="{FF2B5EF4-FFF2-40B4-BE49-F238E27FC236}">
-                <a16:creationId xmlns:a16="http://schemas.microsoft.com/office/drawing/2014/main" id="{F3EFA1D7-5C02-5C46-8D14-AC78C6316567}"/>
-              </a:ext>
-            </a:extLst>
-          </p:cNvPr>
-          <p:cNvSpPr>
-            <a:spLocks noGrp="1"/>
-          </p:cNvSpPr>
-          <p:nvPr>
-            <p:ph type="body" idx="1"/>
-          </p:nvPr>
-        </p:nvSpPr>
-        <p:spPr>
-          <a:xfrm>
-            <a:off x="1747595" y="3225612"/>
-            <a:ext cx="8684109" cy="1500187"/>
-          </a:xfrm>
-        </p:spPr>
-        <p:txBody>
-          <a:bodyPr/>
-          <a:lstStyle/>
-          <a:p>
-            <a:pPr fontAlgn="base"/>
-            <a:r>
-              <a:rPr lang="en-US" i="1" dirty="0">
-                <a:solidFill>
-                  <a:schemeClr val="bg1"/>
-                </a:solidFill>
-              </a:rPr>
-              <a:t>“Incorrect documentation is often worse than no documentation.”</a:t>
-            </a:r>
-          </a:p>
-          <a:p>
-            <a:pPr fontAlgn="base"/>
-            <a:r>
-              <a:rPr lang="en-US" dirty="0">
-                <a:solidFill>
-                  <a:schemeClr val="bg1"/>
-                </a:solidFill>
-              </a:rPr>
-              <a:t>— Bertrand Meyer</a:t>
-            </a:r>
-          </a:p>
-        </p:txBody>
-      </p:sp>
-      <p:sp>
-        <p:nvSpPr>
-          <p:cNvPr id="4" name="Title 1">
-            <a:extLst>
-              <a:ext uri="{FF2B5EF4-FFF2-40B4-BE49-F238E27FC236}">
-                <a16:creationId xmlns:a16="http://schemas.microsoft.com/office/drawing/2014/main" id="{E5E145E0-8A6D-BA43-ABD6-2C9CAE44E411}"/>
-              </a:ext>
-            </a:extLst>
-          </p:cNvPr>
-          <p:cNvSpPr txBox="1">
-            <a:spLocks/>
-          </p:cNvSpPr>
-          <p:nvPr/>
-        </p:nvSpPr>
-        <p:spPr>
-          <a:xfrm>
-            <a:off x="838200" y="4162593"/>
-            <a:ext cx="10515600" cy="2127352"/>
+            <a:off x="499365" y="482161"/>
+            <a:ext cx="11193270" cy="5170646"/>
           </a:xfrm>
           <a:prstGeom prst="rect">
             <a:avLst/>
           </a:prstGeom>
+          <a:noFill/>
         </p:spPr>
         <p:txBody>
-          <a:bodyPr vert="horz" lIns="91440" tIns="45720" rIns="91440" bIns="45720" rtlCol="0" anchor="b">
-            <a:noAutofit/>
+          <a:bodyPr wrap="square" rtlCol="0">
+            <a:spAutoFit/>
           </a:bodyPr>
-          <a:lstStyle>
-            <a:lvl1pPr algn="l" defTabSz="914400" rtl="0" eaLnBrk="1" latinLnBrk="0" hangingPunct="1">
-              <a:lnSpc>
-                <a:spcPct val="90000"/>
-              </a:lnSpc>
-              <a:spcBef>
-                <a:spcPct val="0"/>
-              </a:spcBef>
-              <a:buNone/>
-              <a:defRPr sz="6000" kern="1200">
+          <a:lstStyle/>
+          <a:p>
+            <a:pPr marL="685800" indent="-685800">
+              <a:buFont typeface="Arial" panose="020B0604020202020204" pitchFamily="34" charset="0"/>
+              <a:buChar char="•"/>
+            </a:pPr>
+            <a:r>
+              <a:rPr lang="en-US" sz="6600" dirty="0">
                 <a:solidFill>
                   <a:schemeClr val="bg1"/>
                 </a:solidFill>
-                <a:latin typeface="+mj-lt"/>
-                <a:ea typeface="+mj-ea"/>
-                <a:cs typeface="+mj-cs"/>
-              </a:defRPr>
-            </a:lvl1pPr>
-          </a:lstStyle>
-          <a:p>
-            <a:pPr algn="ctr"/>
-            <a:r>
-              <a:rPr lang="en-US" sz="6600"/>
-              <a:t>ADRs = </a:t>
-            </a:r>
-            <a:r>
-              <a:rPr lang="en-US" sz="9600"/>
-              <a:t>👍🏽</a:t>
-            </a:r>
-            <a:endParaRPr lang="en-US" sz="9600" dirty="0"/>
+              </a:rPr>
+              <a:t>New team member onboarding</a:t>
+            </a:r>
+          </a:p>
+          <a:p>
+            <a:pPr marL="685800" indent="-685800">
+              <a:buFont typeface="Arial" panose="020B0604020202020204" pitchFamily="34" charset="0"/>
+              <a:buChar char="•"/>
+            </a:pPr>
+            <a:r>
+              <a:rPr lang="en-US" sz="6600" dirty="0">
+                <a:solidFill>
+                  <a:schemeClr val="bg1"/>
+                </a:solidFill>
+              </a:rPr>
+              <a:t>Save people from themselves</a:t>
+            </a:r>
+          </a:p>
+          <a:p>
+            <a:pPr marL="685800" indent="-685800">
+              <a:buFont typeface="Arial" panose="020B0604020202020204" pitchFamily="34" charset="0"/>
+              <a:buChar char="•"/>
+            </a:pPr>
+            <a:r>
+              <a:rPr lang="en-US" sz="6600" dirty="0">
+                <a:solidFill>
+                  <a:schemeClr val="bg1"/>
+                </a:solidFill>
+              </a:rPr>
+              <a:t>Informs decision making process</a:t>
+            </a:r>
           </a:p>
         </p:txBody>
       </p:sp>
     </p:spTree>
     <p:extLst>
       <p:ext uri="{BB962C8B-B14F-4D97-AF65-F5344CB8AC3E}">
-        <p14:creationId xmlns:p14="http://schemas.microsoft.com/office/powerpoint/2010/main" val="2346709893"/>
+        <p14:creationId xmlns:p14="http://schemas.microsoft.com/office/powerpoint/2010/main" val="459259026"/>
       </p:ext>
     </p:extLst>
   </p:cSld>
@@ -8353,10 +8421,87 @@
       </p:grpSpPr>
       <p:sp>
         <p:nvSpPr>
+          <p:cNvPr id="2" name="Title 1">
+            <a:extLst>
+              <a:ext uri="{FF2B5EF4-FFF2-40B4-BE49-F238E27FC236}">
+                <a16:creationId xmlns:a16="http://schemas.microsoft.com/office/drawing/2014/main" id="{C409FD33-6233-7C49-9918-532E7EC05AB5}"/>
+              </a:ext>
+            </a:extLst>
+          </p:cNvPr>
+          <p:cNvSpPr>
+            <a:spLocks noGrp="1"/>
+          </p:cNvSpPr>
+          <p:nvPr>
+            <p:ph type="title"/>
+          </p:nvPr>
+        </p:nvSpPr>
+        <p:spPr>
+          <a:xfrm>
+            <a:off x="838199" y="44735"/>
+            <a:ext cx="10515600" cy="1090382"/>
+          </a:xfrm>
+        </p:spPr>
+        <p:txBody>
+          <a:bodyPr>
+            <a:noAutofit/>
+          </a:bodyPr>
+          <a:lstStyle/>
+          <a:p>
+            <a:pPr algn="ctr"/>
+            <a:r>
+              <a:rPr lang="en-US" sz="3600" dirty="0"/>
+              <a:t>More praise for ADRs:</a:t>
+            </a:r>
+            <a:br>
+              <a:rPr lang="en-US" sz="3600" dirty="0"/>
+            </a:br>
+            <a:r>
+              <a:rPr lang="en-US" sz="3600" dirty="0" err="1"/>
+              <a:t>ThoughtWorks</a:t>
+            </a:r>
+            <a:r>
+              <a:rPr lang="en-US" sz="3600" dirty="0"/>
+              <a:t> Technology Radar</a:t>
+            </a:r>
+          </a:p>
+        </p:txBody>
+      </p:sp>
+      <p:pic>
+        <p:nvPicPr>
+          <p:cNvPr id="3" name="Picture 2">
+            <a:extLst>
+              <a:ext uri="{FF2B5EF4-FFF2-40B4-BE49-F238E27FC236}">
+                <a16:creationId xmlns:a16="http://schemas.microsoft.com/office/drawing/2014/main" id="{745EEC11-94B0-9944-A277-0EE4A9EC1456}"/>
+              </a:ext>
+            </a:extLst>
+          </p:cNvPr>
+          <p:cNvPicPr>
+            <a:picLocks noChangeAspect="1"/>
+          </p:cNvPicPr>
+          <p:nvPr/>
+        </p:nvPicPr>
+        <p:blipFill>
+          <a:blip r:embed="rId3"/>
+          <a:stretch>
+            <a:fillRect/>
+          </a:stretch>
+        </p:blipFill>
+        <p:spPr>
+          <a:xfrm>
+            <a:off x="2923983" y="1135117"/>
+            <a:ext cx="6344034" cy="5308816"/>
+          </a:xfrm>
+          <a:prstGeom prst="rect">
+            <a:avLst/>
+          </a:prstGeom>
+        </p:spPr>
+      </p:pic>
+      <p:sp>
+        <p:nvSpPr>
           <p:cNvPr id="4" name="TextBox 3">
             <a:extLst>
               <a:ext uri="{FF2B5EF4-FFF2-40B4-BE49-F238E27FC236}">
-                <a16:creationId xmlns:a16="http://schemas.microsoft.com/office/drawing/2014/main" id="{D9E06190-A811-FA4A-8DFF-25F7864A68C3}"/>
+                <a16:creationId xmlns:a16="http://schemas.microsoft.com/office/drawing/2014/main" id="{B34BF978-8B84-984D-BC27-943E5A8E16E1}"/>
               </a:ext>
             </a:extLst>
           </p:cNvPr>
@@ -8365,8 +8510,8 @@
         </p:nvSpPr>
         <p:spPr>
           <a:xfrm>
-            <a:off x="499365" y="482161"/>
-            <a:ext cx="11193270" cy="5170646"/>
+            <a:off x="3707364" y="6443933"/>
+            <a:ext cx="4777270" cy="369332"/>
           </a:xfrm>
           <a:prstGeom prst="rect">
             <a:avLst/>
@@ -8374,50 +8519,35 @@
           <a:noFill/>
         </p:spPr>
         <p:txBody>
-          <a:bodyPr wrap="square" rtlCol="0">
+          <a:bodyPr wrap="none" rtlCol="0">
             <a:spAutoFit/>
           </a:bodyPr>
           <a:lstStyle/>
           <a:p>
-            <a:pPr marL="685800" indent="-685800">
-              <a:buFont typeface="Arial" panose="020B0604020202020204" pitchFamily="34" charset="0"/>
-              <a:buChar char="•"/>
-            </a:pPr>
-            <a:r>
-              <a:rPr lang="en-US" sz="6600" dirty="0">
+            <a:pPr algn="ctr"/>
+            <a:r>
+              <a:rPr lang="en-US" dirty="0">
                 <a:solidFill>
                   <a:schemeClr val="bg1"/>
                 </a:solidFill>
               </a:rPr>
-              <a:t>New team member onboarding</a:t>
-            </a:r>
-          </a:p>
-          <a:p>
-            <a:pPr marL="685800" indent="-685800">
-              <a:buFont typeface="Arial" panose="020B0604020202020204" pitchFamily="34" charset="0"/>
-              <a:buChar char="•"/>
-            </a:pPr>
-            <a:r>
-              <a:rPr lang="en-US" sz="6600" dirty="0">
+              <a:t>https://</a:t>
+            </a:r>
+            <a:r>
+              <a:rPr lang="en-US" dirty="0" err="1">
                 <a:solidFill>
                   <a:schemeClr val="bg1"/>
                 </a:solidFill>
               </a:rPr>
-              <a:t>Save people from themselves</a:t>
-            </a:r>
-          </a:p>
-          <a:p>
-            <a:pPr marL="685800" indent="-685800">
-              <a:buFont typeface="Arial" panose="020B0604020202020204" pitchFamily="34" charset="0"/>
-              <a:buChar char="•"/>
-            </a:pPr>
-            <a:r>
-              <a:rPr lang="en-US" sz="6600" dirty="0">
+              <a:t>www.thoughtworks.com</a:t>
+            </a:r>
+            <a:r>
+              <a:rPr lang="en-US" dirty="0">
                 <a:solidFill>
                   <a:schemeClr val="bg1"/>
                 </a:solidFill>
               </a:rPr>
-              <a:t>Informs decision making process</a:t>
+              <a:t>/radar/techniques</a:t>
             </a:r>
           </a:p>
         </p:txBody>
@@ -8425,7 +8555,7 @@
     </p:spTree>
     <p:extLst>
       <p:ext uri="{BB962C8B-B14F-4D97-AF65-F5344CB8AC3E}">
-        <p14:creationId xmlns:p14="http://schemas.microsoft.com/office/powerpoint/2010/main" val="459259026"/>
+        <p14:creationId xmlns:p14="http://schemas.microsoft.com/office/powerpoint/2010/main" val="1477915063"/>
       </p:ext>
     </p:extLst>
   </p:cSld>
@@ -8466,7 +8596,7 @@
         </p:nvSpPr>
         <p:spPr>
           <a:xfrm>
-            <a:off x="3166352" y="1290179"/>
+            <a:off x="3166352" y="1069455"/>
             <a:ext cx="5859296" cy="1754326"/>
           </a:xfrm>
           <a:prstGeom prst="rect">
@@ -8589,169 +8719,6 @@
           <p:cNvPr id="2" name="Title 1">
             <a:extLst>
               <a:ext uri="{FF2B5EF4-FFF2-40B4-BE49-F238E27FC236}">
-                <a16:creationId xmlns:a16="http://schemas.microsoft.com/office/drawing/2014/main" id="{C409FD33-6233-7C49-9918-532E7EC05AB5}"/>
-              </a:ext>
-            </a:extLst>
-          </p:cNvPr>
-          <p:cNvSpPr>
-            <a:spLocks noGrp="1"/>
-          </p:cNvSpPr>
-          <p:nvPr>
-            <p:ph type="title"/>
-          </p:nvPr>
-        </p:nvSpPr>
-        <p:spPr>
-          <a:xfrm>
-            <a:off x="838199" y="44735"/>
-            <a:ext cx="10515600" cy="1090382"/>
-          </a:xfrm>
-        </p:spPr>
-        <p:txBody>
-          <a:bodyPr>
-            <a:noAutofit/>
-          </a:bodyPr>
-          <a:lstStyle/>
-          <a:p>
-            <a:pPr algn="ctr"/>
-            <a:r>
-              <a:rPr lang="en-US" sz="3600" dirty="0"/>
-              <a:t>More praise for ADRs:</a:t>
-            </a:r>
-            <a:br>
-              <a:rPr lang="en-US" sz="3600" dirty="0"/>
-            </a:br>
-            <a:r>
-              <a:rPr lang="en-US" sz="3600" dirty="0" err="1"/>
-              <a:t>ThoughtWorks</a:t>
-            </a:r>
-            <a:r>
-              <a:rPr lang="en-US" sz="3600" dirty="0"/>
-              <a:t> Technology Radar</a:t>
-            </a:r>
-          </a:p>
-        </p:txBody>
-      </p:sp>
-      <p:pic>
-        <p:nvPicPr>
-          <p:cNvPr id="3" name="Picture 2">
-            <a:extLst>
-              <a:ext uri="{FF2B5EF4-FFF2-40B4-BE49-F238E27FC236}">
-                <a16:creationId xmlns:a16="http://schemas.microsoft.com/office/drawing/2014/main" id="{745EEC11-94B0-9944-A277-0EE4A9EC1456}"/>
-              </a:ext>
-            </a:extLst>
-          </p:cNvPr>
-          <p:cNvPicPr>
-            <a:picLocks noChangeAspect="1"/>
-          </p:cNvPicPr>
-          <p:nvPr/>
-        </p:nvPicPr>
-        <p:blipFill>
-          <a:blip r:embed="rId3"/>
-          <a:stretch>
-            <a:fillRect/>
-          </a:stretch>
-        </p:blipFill>
-        <p:spPr>
-          <a:xfrm>
-            <a:off x="2923983" y="1135117"/>
-            <a:ext cx="6344034" cy="5308816"/>
-          </a:xfrm>
-          <a:prstGeom prst="rect">
-            <a:avLst/>
-          </a:prstGeom>
-        </p:spPr>
-      </p:pic>
-      <p:sp>
-        <p:nvSpPr>
-          <p:cNvPr id="4" name="TextBox 3">
-            <a:extLst>
-              <a:ext uri="{FF2B5EF4-FFF2-40B4-BE49-F238E27FC236}">
-                <a16:creationId xmlns:a16="http://schemas.microsoft.com/office/drawing/2014/main" id="{B34BF978-8B84-984D-BC27-943E5A8E16E1}"/>
-              </a:ext>
-            </a:extLst>
-          </p:cNvPr>
-          <p:cNvSpPr txBox="1"/>
-          <p:nvPr/>
-        </p:nvSpPr>
-        <p:spPr>
-          <a:xfrm>
-            <a:off x="3707364" y="6443933"/>
-            <a:ext cx="4777270" cy="369332"/>
-          </a:xfrm>
-          <a:prstGeom prst="rect">
-            <a:avLst/>
-          </a:prstGeom>
-          <a:noFill/>
-        </p:spPr>
-        <p:txBody>
-          <a:bodyPr wrap="none" rtlCol="0">
-            <a:spAutoFit/>
-          </a:bodyPr>
-          <a:lstStyle/>
-          <a:p>
-            <a:pPr algn="ctr"/>
-            <a:r>
-              <a:rPr lang="en-US" dirty="0">
-                <a:solidFill>
-                  <a:schemeClr val="bg1"/>
-                </a:solidFill>
-              </a:rPr>
-              <a:t>https://</a:t>
-            </a:r>
-            <a:r>
-              <a:rPr lang="en-US" dirty="0" err="1">
-                <a:solidFill>
-                  <a:schemeClr val="bg1"/>
-                </a:solidFill>
-              </a:rPr>
-              <a:t>www.thoughtworks.com</a:t>
-            </a:r>
-            <a:r>
-              <a:rPr lang="en-US" dirty="0">
-                <a:solidFill>
-                  <a:schemeClr val="bg1"/>
-                </a:solidFill>
-              </a:rPr>
-              <a:t>/radar/techniques</a:t>
-            </a:r>
-          </a:p>
-        </p:txBody>
-      </p:sp>
-    </p:spTree>
-    <p:extLst>
-      <p:ext uri="{BB962C8B-B14F-4D97-AF65-F5344CB8AC3E}">
-        <p14:creationId xmlns:p14="http://schemas.microsoft.com/office/powerpoint/2010/main" val="1477915063"/>
-      </p:ext>
-    </p:extLst>
-  </p:cSld>
-  <p:clrMapOvr>
-    <a:masterClrMapping/>
-  </p:clrMapOvr>
-</p:sld>
-</file>
-
-<file path=ppt/slides/slide21.xml><?xml version="1.0" encoding="utf-8"?>
-<p:sld xmlns:a="http://schemas.openxmlformats.org/drawingml/2006/main" xmlns:r="http://schemas.openxmlformats.org/officeDocument/2006/relationships" xmlns:p="http://schemas.openxmlformats.org/presentationml/2006/main">
-  <p:cSld>
-    <p:spTree>
-      <p:nvGrpSpPr>
-        <p:cNvPr id="1" name=""/>
-        <p:cNvGrpSpPr/>
-        <p:nvPr/>
-      </p:nvGrpSpPr>
-      <p:grpSpPr>
-        <a:xfrm>
-          <a:off x="0" y="0"/>
-          <a:ext cx="0" cy="0"/>
-          <a:chOff x="0" y="0"/>
-          <a:chExt cx="0" cy="0"/>
-        </a:xfrm>
-      </p:grpSpPr>
-      <p:sp>
-        <p:nvSpPr>
-          <p:cNvPr id="2" name="Title 1">
-            <a:extLst>
-              <a:ext uri="{FF2B5EF4-FFF2-40B4-BE49-F238E27FC236}">
                 <a16:creationId xmlns:a16="http://schemas.microsoft.com/office/drawing/2014/main" id="{9F053D3E-4961-4145-82AD-E2410D863096}"/>
               </a:ext>
             </a:extLst>
@@ -8806,7 +8773,7 @@
         </p:spPr>
         <p:txBody>
           <a:bodyPr>
-            <a:normAutofit lnSpcReduction="10000"/>
+            <a:normAutofit fontScale="92500" lnSpcReduction="20000"/>
           </a:bodyPr>
           <a:lstStyle/>
           <a:p>
@@ -8818,7 +8785,7 @@
           <a:p>
             <a:r>
               <a:rPr lang="en-US" sz="3200" dirty="0">
-                <a:hlinkClick r:id="rId2">
+                <a:hlinkClick r:id="rId3">
                   <a:extLst>
                     <a:ext uri="{A12FA001-AC4F-418D-AE19-62706E023703}">
                       <ahyp:hlinkClr xmlns:ahyp="http://schemas.microsoft.com/office/drawing/2018/hyperlinkcolor" val="tx"/>
@@ -8849,15 +8816,20 @@
           </a:p>
           <a:p>
             <a:r>
-              <a:rPr lang="en-US" sz="3200" dirty="0" err="1"/>
+              <a:rPr lang="en-US" sz="3200" dirty="0">
+                <a:hlinkClick r:id="rId4"/>
+              </a:rPr>
               <a:t>david.ayers@credera.com</a:t>
             </a:r>
             <a:endParaRPr lang="en-US" sz="3200" dirty="0"/>
           </a:p>
           <a:p>
+            <a:endParaRPr lang="en-US" sz="3200" dirty="0"/>
+          </a:p>
+          <a:p>
             <a:r>
               <a:rPr lang="en-US" sz="3200" dirty="0"/>
-              <a:t>@</a:t>
+              <a:t>        @</a:t>
             </a:r>
             <a:r>
               <a:rPr lang="en-US" sz="3200" dirty="0" err="1"/>
@@ -8867,6 +8839,50 @@
           </a:p>
         </p:txBody>
       </p:sp>
+      <p:pic>
+        <p:nvPicPr>
+          <p:cNvPr id="5" name="Picture 4">
+            <a:extLst>
+              <a:ext uri="{FF2B5EF4-FFF2-40B4-BE49-F238E27FC236}">
+                <a16:creationId xmlns:a16="http://schemas.microsoft.com/office/drawing/2014/main" id="{C0E9D5B8-2BDF-6741-AAEA-75DD1637B1E8}"/>
+              </a:ext>
+            </a:extLst>
+          </p:cNvPr>
+          <p:cNvPicPr>
+            <a:picLocks noChangeAspect="1"/>
+          </p:cNvPicPr>
+          <p:nvPr/>
+        </p:nvPicPr>
+        <p:blipFill>
+          <a:blip r:embed="rId5">
+            <a:clrChange>
+              <a:clrFrom>
+                <a:srgbClr val="282F36">
+                  <a:alpha val="14902"/>
+                </a:srgbClr>
+              </a:clrFrom>
+              <a:clrTo>
+                <a:srgbClr val="282F36">
+                  <a:alpha val="0"/>
+                </a:srgbClr>
+              </a:clrTo>
+            </a:clrChange>
+            <a:alphaModFix/>
+          </a:blip>
+          <a:stretch>
+            <a:fillRect/>
+          </a:stretch>
+        </p:blipFill>
+        <p:spPr>
+          <a:xfrm>
+            <a:off x="4205907" y="4956875"/>
+            <a:ext cx="962571" cy="962571"/>
+          </a:xfrm>
+          <a:prstGeom prst="rect">
+            <a:avLst/>
+          </a:prstGeom>
+        </p:spPr>
+      </p:pic>
     </p:spTree>
     <p:extLst>
       <p:ext uri="{BB962C8B-B14F-4D97-AF65-F5344CB8AC3E}">
@@ -8948,14 +8964,6 @@
           </a:p>
           <a:p>
             <a:pPr algn="ctr"/>
-            <a:r>
-              <a:rPr lang="en-US" sz="16600" dirty="0">
-                <a:solidFill>
-                  <a:schemeClr val="bg1"/>
-                </a:solidFill>
-              </a:rPr>
-              <a:t>😪</a:t>
-            </a:r>
             <a:endParaRPr lang="en-US" sz="5400" dirty="0">
               <a:solidFill>
                 <a:schemeClr val="bg1"/>
@@ -8964,6 +8972,14 @@
           </a:p>
           <a:p>
             <a:pPr algn="ctr"/>
+            <a:r>
+              <a:rPr lang="en-US" sz="16600" dirty="0">
+                <a:solidFill>
+                  <a:schemeClr val="bg1"/>
+                </a:solidFill>
+              </a:rPr>
+              <a:t>😪</a:t>
+            </a:r>
             <a:endParaRPr lang="en-US" sz="5400" dirty="0">
               <a:solidFill>
                 <a:schemeClr val="bg1"/>
@@ -9022,7 +9038,7 @@
           <a:prstGeom prst="cloudCallout">
             <a:avLst>
               <a:gd name="adj1" fmla="val -671"/>
-              <a:gd name="adj2" fmla="val 74745"/>
+              <a:gd name="adj2" fmla="val 93636"/>
             </a:avLst>
           </a:prstGeom>
         </p:spPr>
@@ -9073,7 +9089,7 @@
         </p:nvSpPr>
         <p:spPr>
           <a:xfrm>
-            <a:off x="5426586" y="2220396"/>
+            <a:off x="5426586" y="2709142"/>
             <a:ext cx="1338828" cy="1477328"/>
           </a:xfrm>
           <a:prstGeom prst="rect">
@@ -9497,117 +9513,6 @@
 </file>
 
 <file path=ppt/slides/slide6.xml><?xml version="1.0" encoding="utf-8"?>
-<p:sld xmlns:a="http://schemas.openxmlformats.org/drawingml/2006/main" xmlns:r="http://schemas.openxmlformats.org/officeDocument/2006/relationships" xmlns:p="http://schemas.openxmlformats.org/presentationml/2006/main">
-  <p:cSld>
-    <p:spTree>
-      <p:nvGrpSpPr>
-        <p:cNvPr id="1" name=""/>
-        <p:cNvGrpSpPr/>
-        <p:nvPr/>
-      </p:nvGrpSpPr>
-      <p:grpSpPr>
-        <a:xfrm>
-          <a:off x="0" y="0"/>
-          <a:ext cx="0" cy="0"/>
-          <a:chOff x="0" y="0"/>
-          <a:chExt cx="0" cy="0"/>
-        </a:xfrm>
-      </p:grpSpPr>
-      <p:sp>
-        <p:nvSpPr>
-          <p:cNvPr id="4" name="TextBox 3">
-            <a:extLst>
-              <a:ext uri="{FF2B5EF4-FFF2-40B4-BE49-F238E27FC236}">
-                <a16:creationId xmlns:a16="http://schemas.microsoft.com/office/drawing/2014/main" id="{D9E06190-A811-FA4A-8DFF-25F7864A68C3}"/>
-              </a:ext>
-            </a:extLst>
-          </p:cNvPr>
-          <p:cNvSpPr txBox="1"/>
-          <p:nvPr/>
-        </p:nvSpPr>
-        <p:spPr>
-          <a:xfrm>
-            <a:off x="1008777" y="1446530"/>
-            <a:ext cx="10360530" cy="4247317"/>
-          </a:xfrm>
-          <a:prstGeom prst="rect">
-            <a:avLst/>
-          </a:prstGeom>
-          <a:noFill/>
-        </p:spPr>
-        <p:txBody>
-          <a:bodyPr wrap="none" rtlCol="0">
-            <a:spAutoFit/>
-          </a:bodyPr>
-          <a:lstStyle/>
-          <a:p>
-            <a:pPr algn="ctr"/>
-            <a:r>
-              <a:rPr lang="en-US" sz="5400" i="1" dirty="0">
-                <a:solidFill>
-                  <a:schemeClr val="bg1"/>
-                </a:solidFill>
-              </a:rPr>
-              <a:t>ADRs are:</a:t>
-            </a:r>
-          </a:p>
-          <a:p>
-            <a:pPr algn="ctr"/>
-            <a:r>
-              <a:rPr lang="en-US" sz="5400" dirty="0">
-                <a:solidFill>
-                  <a:schemeClr val="bg1"/>
-                </a:solidFill>
-              </a:rPr>
-              <a:t>Saved in a file with an </a:t>
-            </a:r>
-          </a:p>
-          <a:p>
-            <a:pPr algn="ctr"/>
-            <a:r>
-              <a:rPr lang="en-US" sz="5400" dirty="0">
-                <a:solidFill>
-                  <a:schemeClr val="bg1"/>
-                </a:solidFill>
-              </a:rPr>
-              <a:t>incrementing sequence:</a:t>
-            </a:r>
-          </a:p>
-          <a:p>
-            <a:pPr algn="ctr"/>
-            <a:r>
-              <a:rPr lang="en-US" sz="5400" b="1" dirty="0">
-                <a:solidFill>
-                  <a:schemeClr val="bg1"/>
-                </a:solidFill>
-              </a:rPr>
-              <a:t>0001-git-for-version-control.md</a:t>
-            </a:r>
-          </a:p>
-          <a:p>
-            <a:pPr algn="ctr"/>
-            <a:endParaRPr lang="en-US" sz="5400" dirty="0">
-              <a:solidFill>
-                <a:schemeClr val="bg1"/>
-              </a:solidFill>
-            </a:endParaRPr>
-          </a:p>
-        </p:txBody>
-      </p:sp>
-    </p:spTree>
-    <p:extLst>
-      <p:ext uri="{BB962C8B-B14F-4D97-AF65-F5344CB8AC3E}">
-        <p14:creationId xmlns:p14="http://schemas.microsoft.com/office/powerpoint/2010/main" val="3387562561"/>
-      </p:ext>
-    </p:extLst>
-  </p:cSld>
-  <p:clrMapOvr>
-    <a:masterClrMapping/>
-  </p:clrMapOvr>
-</p:sld>
-</file>
-
-<file path=ppt/slides/slide7.xml><?xml version="1.0" encoding="utf-8"?>
 <p:sld xmlns:a="http://schemas.openxmlformats.org/drawingml/2006/main" xmlns:r="http://schemas.openxmlformats.org/officeDocument/2006/relationships" xmlns:p="http://schemas.openxmlformats.org/presentationml/2006/main">
   <p:cSld>
     <p:spTree>
@@ -9733,7 +9638,7 @@
 </p:sld>
 </file>
 
-<file path=ppt/slides/slide8.xml><?xml version="1.0" encoding="utf-8"?>
+<file path=ppt/slides/slide7.xml><?xml version="1.0" encoding="utf-8"?>
 <p:sld xmlns:a="http://schemas.openxmlformats.org/drawingml/2006/main" xmlns:r="http://schemas.openxmlformats.org/officeDocument/2006/relationships" xmlns:p="http://schemas.openxmlformats.org/presentationml/2006/main">
   <p:cSld>
     <p:spTree>
@@ -9793,7 +9698,7 @@
 </p:sld>
 </file>
 
-<file path=ppt/slides/slide9.xml><?xml version="1.0" encoding="utf-8"?>
+<file path=ppt/slides/slide8.xml><?xml version="1.0" encoding="utf-8"?>
 <p:sld xmlns:a="http://schemas.openxmlformats.org/drawingml/2006/main" xmlns:r="http://schemas.openxmlformats.org/officeDocument/2006/relationships" xmlns:p="http://schemas.openxmlformats.org/presentationml/2006/main">
   <p:cSld>
     <p:spTree>
@@ -9966,6 +9871,188 @@
     <p:extLst>
       <p:ext uri="{BB962C8B-B14F-4D97-AF65-F5344CB8AC3E}">
         <p14:creationId xmlns:p14="http://schemas.microsoft.com/office/powerpoint/2010/main" val="18341643"/>
+      </p:ext>
+    </p:extLst>
+  </p:cSld>
+  <p:clrMapOvr>
+    <a:masterClrMapping/>
+  </p:clrMapOvr>
+</p:sld>
+</file>
+
+<file path=ppt/slides/slide9.xml><?xml version="1.0" encoding="utf-8"?>
+<p:sld xmlns:a="http://schemas.openxmlformats.org/drawingml/2006/main" xmlns:r="http://schemas.openxmlformats.org/officeDocument/2006/relationships" xmlns:p="http://schemas.openxmlformats.org/presentationml/2006/main">
+  <p:cSld>
+    <p:spTree>
+      <p:nvGrpSpPr>
+        <p:cNvPr id="1" name=""/>
+        <p:cNvGrpSpPr/>
+        <p:nvPr/>
+      </p:nvGrpSpPr>
+      <p:grpSpPr>
+        <a:xfrm>
+          <a:off x="0" y="0"/>
+          <a:ext cx="0" cy="0"/>
+          <a:chOff x="0" y="0"/>
+          <a:chExt cx="0" cy="0"/>
+        </a:xfrm>
+      </p:grpSpPr>
+      <p:pic>
+        <p:nvPicPr>
+          <p:cNvPr id="4" name="Picture 3">
+            <a:extLst>
+              <a:ext uri="{FF2B5EF4-FFF2-40B4-BE49-F238E27FC236}">
+                <a16:creationId xmlns:a16="http://schemas.microsoft.com/office/drawing/2014/main" id="{B66986D0-EB48-794D-BB7E-C84315408B86}"/>
+              </a:ext>
+            </a:extLst>
+          </p:cNvPr>
+          <p:cNvPicPr>
+            <a:picLocks noChangeAspect="1"/>
+          </p:cNvPicPr>
+          <p:nvPr/>
+        </p:nvPicPr>
+        <p:blipFill>
+          <a:blip r:embed="rId3">
+            <a:extLst>
+              <a:ext uri="{BEBA8EAE-BF5A-486C-A8C5-ECC9F3942E4B}">
+                <a14:imgProps xmlns:a14="http://schemas.microsoft.com/office/drawing/2010/main">
+                  <a14:imgLayer>
+                    <a14:imgEffect>
+                      <a14:artisticBlur/>
+                    </a14:imgEffect>
+                  </a14:imgLayer>
+                </a14:imgProps>
+              </a:ext>
+            </a:extLst>
+          </a:blip>
+          <a:stretch>
+            <a:fillRect/>
+          </a:stretch>
+        </p:blipFill>
+        <p:spPr>
+          <a:xfrm>
+            <a:off x="2202831" y="0"/>
+            <a:ext cx="7786339" cy="6858000"/>
+          </a:xfrm>
+          <a:prstGeom prst="rect">
+            <a:avLst/>
+          </a:prstGeom>
+        </p:spPr>
+      </p:pic>
+      <p:pic>
+        <p:nvPicPr>
+          <p:cNvPr id="2" name="Picture 1">
+            <a:extLst>
+              <a:ext uri="{FF2B5EF4-FFF2-40B4-BE49-F238E27FC236}">
+                <a16:creationId xmlns:a16="http://schemas.microsoft.com/office/drawing/2014/main" id="{BD0230DF-A64A-E947-8F63-21C8D2534883}"/>
+              </a:ext>
+            </a:extLst>
+          </p:cNvPr>
+          <p:cNvPicPr>
+            <a:picLocks noChangeAspect="1"/>
+          </p:cNvPicPr>
+          <p:nvPr/>
+        </p:nvPicPr>
+        <p:blipFill rotWithShape="1">
+          <a:blip r:embed="rId4"/>
+          <a:srcRect t="14410" b="72687"/>
+          <a:stretch/>
+        </p:blipFill>
+        <p:spPr>
+          <a:xfrm>
+            <a:off x="2202831" y="988142"/>
+            <a:ext cx="7786339" cy="884903"/>
+          </a:xfrm>
+          <a:prstGeom prst="rect">
+            <a:avLst/>
+          </a:prstGeom>
+        </p:spPr>
+      </p:pic>
+      <p:sp>
+        <p:nvSpPr>
+          <p:cNvPr id="5" name="TextBox 4">
+            <a:extLst>
+              <a:ext uri="{FF2B5EF4-FFF2-40B4-BE49-F238E27FC236}">
+                <a16:creationId xmlns:a16="http://schemas.microsoft.com/office/drawing/2014/main" id="{D84897DD-3562-C143-A690-430146840081}"/>
+              </a:ext>
+            </a:extLst>
+          </p:cNvPr>
+          <p:cNvSpPr txBox="1"/>
+          <p:nvPr/>
+        </p:nvSpPr>
+        <p:spPr>
+          <a:xfrm>
+            <a:off x="5592523" y="824016"/>
+            <a:ext cx="1556836" cy="769441"/>
+          </a:xfrm>
+          <a:prstGeom prst="rect">
+            <a:avLst/>
+          </a:prstGeom>
+          <a:noFill/>
+        </p:spPr>
+        <p:txBody>
+          <a:bodyPr wrap="none" rtlCol="0">
+            <a:spAutoFit/>
+          </a:bodyPr>
+          <a:lstStyle/>
+          <a:p>
+            <a:r>
+              <a:rPr lang="en-US" sz="4400" dirty="0"/>
+              <a:t>Status</a:t>
+            </a:r>
+          </a:p>
+        </p:txBody>
+      </p:sp>
+      <p:sp>
+        <p:nvSpPr>
+          <p:cNvPr id="8" name="Left Arrow 7">
+            <a:extLst>
+              <a:ext uri="{FF2B5EF4-FFF2-40B4-BE49-F238E27FC236}">
+                <a16:creationId xmlns:a16="http://schemas.microsoft.com/office/drawing/2014/main" id="{F5BA64AF-9A79-5E4C-8FDC-FB51331AE991}"/>
+              </a:ext>
+            </a:extLst>
+          </p:cNvPr>
+          <p:cNvSpPr/>
+          <p:nvPr/>
+        </p:nvSpPr>
+        <p:spPr>
+          <a:xfrm>
+            <a:off x="3536342" y="544429"/>
+            <a:ext cx="1917291" cy="1328616"/>
+          </a:xfrm>
+          <a:prstGeom prst="leftArrow">
+            <a:avLst/>
+          </a:prstGeom>
+        </p:spPr>
+        <p:style>
+          <a:lnRef idx="2">
+            <a:schemeClr val="accent1">
+              <a:shade val="50000"/>
+            </a:schemeClr>
+          </a:lnRef>
+          <a:fillRef idx="1">
+            <a:schemeClr val="accent1"/>
+          </a:fillRef>
+          <a:effectRef idx="0">
+            <a:schemeClr val="accent1"/>
+          </a:effectRef>
+          <a:fontRef idx="minor">
+            <a:schemeClr val="lt1"/>
+          </a:fontRef>
+        </p:style>
+        <p:txBody>
+          <a:bodyPr rtlCol="0" anchor="ctr"/>
+          <a:lstStyle/>
+          <a:p>
+            <a:pPr algn="ctr"/>
+            <a:endParaRPr lang="en-US"/>
+          </a:p>
+        </p:txBody>
+      </p:sp>
+    </p:spTree>
+    <p:extLst>
+      <p:ext uri="{BB962C8B-B14F-4D97-AF65-F5344CB8AC3E}">
+        <p14:creationId xmlns:p14="http://schemas.microsoft.com/office/powerpoint/2010/main" val="982979819"/>
       </p:ext>
     </p:extLst>
   </p:cSld>

</xml_diff>